<commit_message>
Updated RTABMap block diagram
</commit_message>
<xml_diff>
--- a/Presentations/CDR_Fall_2015/Individual_Slides/Steve/Perception.pptx
+++ b/Presentations/CDR_Fall_2015/Individual_Slides/Steve/Perception.pptx
@@ -64,7 +64,7 @@
       </p:grpSpPr>
       <p:sp>
         <p:nvSpPr>
-          <p:cNvPr id="24" name="PlaceHolder 1"/>
+          <p:cNvPr id="23" name="PlaceHolder 1"/>
           <p:cNvSpPr>
             <a:spLocks noGrp="1"/>
           </p:cNvSpPr>
@@ -75,7 +75,7 @@
         <p:spPr>
           <a:xfrm>
             <a:off x="685800" y="2130480"/>
-            <a:ext cx="7771680" cy="1469160"/>
+            <a:ext cx="7771320" cy="1468800"/>
           </a:xfrm>
           <a:prstGeom prst="rect">
             <a:avLst/>
@@ -91,7 +91,7 @@
       </p:sp>
       <p:sp>
         <p:nvSpPr>
-          <p:cNvPr id="25" name="PlaceHolder 2"/>
+          <p:cNvPr id="24" name="PlaceHolder 2"/>
           <p:cNvSpPr>
             <a:spLocks noGrp="1"/>
           </p:cNvSpPr>
@@ -102,7 +102,7 @@
         <p:spPr>
           <a:xfrm>
             <a:off x="1371600" y="3886200"/>
-            <a:ext cx="6400080" cy="835560"/>
+            <a:ext cx="6399720" cy="835200"/>
           </a:xfrm>
           <a:prstGeom prst="rect">
             <a:avLst/>
@@ -117,7 +117,7 @@
       </p:sp>
       <p:sp>
         <p:nvSpPr>
-          <p:cNvPr id="26" name="PlaceHolder 3"/>
+          <p:cNvPr id="25" name="PlaceHolder 3"/>
           <p:cNvSpPr>
             <a:spLocks noGrp="1"/>
           </p:cNvSpPr>
@@ -127,8 +127,8 @@
         </p:nvSpPr>
         <p:spPr>
           <a:xfrm>
-            <a:off x="1371600" y="4801680"/>
-            <a:ext cx="6400080" cy="835560"/>
+            <a:off x="1371600" y="4800960"/>
+            <a:ext cx="6399720" cy="835200"/>
           </a:xfrm>
           <a:prstGeom prst="rect">
             <a:avLst/>
@@ -165,7 +165,7 @@
       </p:grpSpPr>
       <p:sp>
         <p:nvSpPr>
-          <p:cNvPr id="27" name="PlaceHolder 1"/>
+          <p:cNvPr id="26" name="PlaceHolder 1"/>
           <p:cNvSpPr>
             <a:spLocks noGrp="1"/>
           </p:cNvSpPr>
@@ -176,7 +176,7 @@
         <p:spPr>
           <a:xfrm>
             <a:off x="685800" y="2130480"/>
-            <a:ext cx="7771680" cy="1469160"/>
+            <a:ext cx="7771320" cy="1468800"/>
           </a:xfrm>
           <a:prstGeom prst="rect">
             <a:avLst/>
@@ -192,7 +192,7 @@
       </p:sp>
       <p:sp>
         <p:nvSpPr>
-          <p:cNvPr id="28" name="PlaceHolder 2"/>
+          <p:cNvPr id="27" name="PlaceHolder 2"/>
           <p:cNvSpPr>
             <a:spLocks noGrp="1"/>
           </p:cNvSpPr>
@@ -203,7 +203,7 @@
         <p:spPr>
           <a:xfrm>
             <a:off x="1371600" y="3886200"/>
-            <a:ext cx="3123000" cy="835560"/>
+            <a:ext cx="3123000" cy="835200"/>
           </a:xfrm>
           <a:prstGeom prst="rect">
             <a:avLst/>
@@ -218,7 +218,7 @@
       </p:sp>
       <p:sp>
         <p:nvSpPr>
-          <p:cNvPr id="29" name="PlaceHolder 3"/>
+          <p:cNvPr id="28" name="PlaceHolder 3"/>
           <p:cNvSpPr>
             <a:spLocks noGrp="1"/>
           </p:cNvSpPr>
@@ -229,7 +229,7 @@
         <p:spPr>
           <a:xfrm>
             <a:off x="4651200" y="3886200"/>
-            <a:ext cx="3123000" cy="835560"/>
+            <a:ext cx="3123000" cy="835200"/>
           </a:xfrm>
           <a:prstGeom prst="rect">
             <a:avLst/>
@@ -244,7 +244,7 @@
       </p:sp>
       <p:sp>
         <p:nvSpPr>
-          <p:cNvPr id="30" name="PlaceHolder 4"/>
+          <p:cNvPr id="29" name="PlaceHolder 4"/>
           <p:cNvSpPr>
             <a:spLocks noGrp="1"/>
           </p:cNvSpPr>
@@ -254,8 +254,8 @@
         </p:nvSpPr>
         <p:spPr>
           <a:xfrm>
-            <a:off x="4651200" y="4801680"/>
-            <a:ext cx="3123000" cy="835560"/>
+            <a:off x="4651200" y="4800960"/>
+            <a:ext cx="3123000" cy="835200"/>
           </a:xfrm>
           <a:prstGeom prst="rect">
             <a:avLst/>
@@ -270,7 +270,7 @@
       </p:sp>
       <p:sp>
         <p:nvSpPr>
-          <p:cNvPr id="31" name="PlaceHolder 5"/>
+          <p:cNvPr id="30" name="PlaceHolder 5"/>
           <p:cNvSpPr>
             <a:spLocks noGrp="1"/>
           </p:cNvSpPr>
@@ -280,8 +280,8 @@
         </p:nvSpPr>
         <p:spPr>
           <a:xfrm>
-            <a:off x="1371600" y="4801680"/>
-            <a:ext cx="3123000" cy="835560"/>
+            <a:off x="1371600" y="4800960"/>
+            <a:ext cx="3123000" cy="835200"/>
           </a:xfrm>
           <a:prstGeom prst="rect">
             <a:avLst/>
@@ -318,7 +318,7 @@
       </p:grpSpPr>
       <p:sp>
         <p:nvSpPr>
-          <p:cNvPr id="32" name="PlaceHolder 1"/>
+          <p:cNvPr id="31" name="PlaceHolder 1"/>
           <p:cNvSpPr>
             <a:spLocks noGrp="1"/>
           </p:cNvSpPr>
@@ -329,7 +329,7 @@
         <p:spPr>
           <a:xfrm>
             <a:off x="685800" y="2130480"/>
-            <a:ext cx="7771680" cy="1469160"/>
+            <a:ext cx="7771320" cy="1468800"/>
           </a:xfrm>
           <a:prstGeom prst="rect">
             <a:avLst/>
@@ -345,7 +345,7 @@
       </p:sp>
       <p:sp>
         <p:nvSpPr>
-          <p:cNvPr id="33" name="PlaceHolder 2"/>
+          <p:cNvPr id="32" name="PlaceHolder 2"/>
           <p:cNvSpPr>
             <a:spLocks noGrp="1"/>
           </p:cNvSpPr>
@@ -356,7 +356,7 @@
         <p:spPr>
           <a:xfrm>
             <a:off x="1371600" y="3886200"/>
-            <a:ext cx="6400080" cy="1751760"/>
+            <a:ext cx="6399720" cy="1751400"/>
           </a:xfrm>
           <a:prstGeom prst="rect">
             <a:avLst/>
@@ -371,7 +371,7 @@
       </p:sp>
       <p:sp>
         <p:nvSpPr>
-          <p:cNvPr id="34" name="PlaceHolder 3"/>
+          <p:cNvPr id="33" name="PlaceHolder 3"/>
           <p:cNvSpPr>
             <a:spLocks noGrp="1"/>
           </p:cNvSpPr>
@@ -382,7 +382,7 @@
         <p:spPr>
           <a:xfrm>
             <a:off x="1371600" y="3886200"/>
-            <a:ext cx="6400080" cy="1751760"/>
+            <a:ext cx="6399720" cy="1751400"/>
           </a:xfrm>
           <a:prstGeom prst="rect">
             <a:avLst/>
@@ -395,6 +395,29 @@
           </a:p>
         </p:txBody>
       </p:sp>
+      <p:pic>
+        <p:nvPicPr>
+          <p:cNvPr id="34" name="" descr=""/>
+          <p:cNvPicPr/>
+          <p:nvPr/>
+        </p:nvPicPr>
+        <p:blipFill>
+          <a:blip r:embed="rId2"/>
+          <a:stretch/>
+        </p:blipFill>
+        <p:spPr>
+          <a:xfrm>
+            <a:off x="3473640" y="3885840"/>
+            <a:ext cx="2194920" cy="1751400"/>
+          </a:xfrm>
+          <a:prstGeom prst="rect">
+            <a:avLst/>
+          </a:prstGeom>
+          <a:ln>
+            <a:noFill/>
+          </a:ln>
+        </p:spPr>
+      </p:pic>
       <p:pic>
         <p:nvPicPr>
           <p:cNvPr id="35" name="" descr=""/>
@@ -402,36 +425,13 @@
           <p:nvPr/>
         </p:nvPicPr>
         <p:blipFill>
-          <a:blip r:embed="rId2"/>
-          <a:stretch/>
-        </p:blipFill>
-        <p:spPr>
-          <a:xfrm>
-            <a:off x="3474000" y="3886200"/>
-            <a:ext cx="2195280" cy="1751760"/>
-          </a:xfrm>
-          <a:prstGeom prst="rect">
-            <a:avLst/>
-          </a:prstGeom>
-          <a:ln>
-            <a:noFill/>
-          </a:ln>
-        </p:spPr>
-      </p:pic>
-      <p:pic>
-        <p:nvPicPr>
-          <p:cNvPr id="36" name="" descr=""/>
-          <p:cNvPicPr/>
-          <p:nvPr/>
-        </p:nvPicPr>
-        <p:blipFill>
           <a:blip r:embed="rId3"/>
           <a:stretch/>
         </p:blipFill>
         <p:spPr>
           <a:xfrm>
-            <a:off x="3474000" y="3886200"/>
-            <a:ext cx="2195280" cy="1751760"/>
+            <a:off x="3473640" y="3885840"/>
+            <a:ext cx="2194920" cy="1751400"/>
           </a:xfrm>
           <a:prstGeom prst="rect">
             <a:avLst/>
@@ -487,7 +487,7 @@
       </p:grpSpPr>
       <p:sp>
         <p:nvSpPr>
-          <p:cNvPr id="40" name="PlaceHolder 1"/>
+          <p:cNvPr id="38" name="PlaceHolder 1"/>
           <p:cNvSpPr>
             <a:spLocks noGrp="1"/>
           </p:cNvSpPr>
@@ -498,7 +498,7 @@
         <p:spPr>
           <a:xfrm>
             <a:off x="685800" y="2130480"/>
-            <a:ext cx="7771680" cy="1469160"/>
+            <a:ext cx="7771320" cy="1468800"/>
           </a:xfrm>
           <a:prstGeom prst="rect">
             <a:avLst/>
@@ -514,7 +514,7 @@
       </p:sp>
       <p:sp>
         <p:nvSpPr>
-          <p:cNvPr id="41" name="PlaceHolder 2"/>
+          <p:cNvPr id="39" name="PlaceHolder 2"/>
           <p:cNvSpPr>
             <a:spLocks noGrp="1"/>
           </p:cNvSpPr>
@@ -525,7 +525,7 @@
         <p:spPr>
           <a:xfrm>
             <a:off x="1371600" y="3886200"/>
-            <a:ext cx="6400080" cy="1751760"/>
+            <a:ext cx="6399720" cy="1751400"/>
           </a:xfrm>
           <a:prstGeom prst="rect">
             <a:avLst/>
@@ -563,7 +563,7 @@
       </p:grpSpPr>
       <p:sp>
         <p:nvSpPr>
-          <p:cNvPr id="42" name="PlaceHolder 1"/>
+          <p:cNvPr id="40" name="PlaceHolder 1"/>
           <p:cNvSpPr>
             <a:spLocks noGrp="1"/>
           </p:cNvSpPr>
@@ -574,7 +574,7 @@
         <p:spPr>
           <a:xfrm>
             <a:off x="685800" y="2130480"/>
-            <a:ext cx="7771680" cy="1469160"/>
+            <a:ext cx="7771320" cy="1468800"/>
           </a:xfrm>
           <a:prstGeom prst="rect">
             <a:avLst/>
@@ -590,7 +590,7 @@
       </p:sp>
       <p:sp>
         <p:nvSpPr>
-          <p:cNvPr id="43" name="PlaceHolder 2"/>
+          <p:cNvPr id="41" name="PlaceHolder 2"/>
           <p:cNvSpPr>
             <a:spLocks noGrp="1"/>
           </p:cNvSpPr>
@@ -601,7 +601,7 @@
         <p:spPr>
           <a:xfrm>
             <a:off x="1371600" y="3886200"/>
-            <a:ext cx="6400080" cy="1751760"/>
+            <a:ext cx="6399720" cy="1751400"/>
           </a:xfrm>
           <a:prstGeom prst="rect">
             <a:avLst/>
@@ -638,7 +638,7 @@
       </p:grpSpPr>
       <p:sp>
         <p:nvSpPr>
-          <p:cNvPr id="44" name="PlaceHolder 1"/>
+          <p:cNvPr id="42" name="PlaceHolder 1"/>
           <p:cNvSpPr>
             <a:spLocks noGrp="1"/>
           </p:cNvSpPr>
@@ -649,7 +649,7 @@
         <p:spPr>
           <a:xfrm>
             <a:off x="685800" y="2130480"/>
-            <a:ext cx="7771680" cy="1469160"/>
+            <a:ext cx="7771320" cy="1468800"/>
           </a:xfrm>
           <a:prstGeom prst="rect">
             <a:avLst/>
@@ -665,7 +665,7 @@
       </p:sp>
       <p:sp>
         <p:nvSpPr>
-          <p:cNvPr id="45" name="PlaceHolder 2"/>
+          <p:cNvPr id="43" name="PlaceHolder 2"/>
           <p:cNvSpPr>
             <a:spLocks noGrp="1"/>
           </p:cNvSpPr>
@@ -676,7 +676,7 @@
         <p:spPr>
           <a:xfrm>
             <a:off x="1371600" y="3886200"/>
-            <a:ext cx="3123000" cy="1751760"/>
+            <a:ext cx="3123000" cy="1751400"/>
           </a:xfrm>
           <a:prstGeom prst="rect">
             <a:avLst/>
@@ -691,7 +691,7 @@
       </p:sp>
       <p:sp>
         <p:nvSpPr>
-          <p:cNvPr id="46" name="PlaceHolder 3"/>
+          <p:cNvPr id="44" name="PlaceHolder 3"/>
           <p:cNvSpPr>
             <a:spLocks noGrp="1"/>
           </p:cNvSpPr>
@@ -702,7 +702,7 @@
         <p:spPr>
           <a:xfrm>
             <a:off x="4651200" y="3886200"/>
-            <a:ext cx="3123000" cy="1751760"/>
+            <a:ext cx="3123000" cy="1751400"/>
           </a:xfrm>
           <a:prstGeom prst="rect">
             <a:avLst/>
@@ -739,7 +739,7 @@
       </p:grpSpPr>
       <p:sp>
         <p:nvSpPr>
-          <p:cNvPr id="47" name="PlaceHolder 1"/>
+          <p:cNvPr id="45" name="PlaceHolder 1"/>
           <p:cNvSpPr>
             <a:spLocks noGrp="1"/>
           </p:cNvSpPr>
@@ -750,7 +750,7 @@
         <p:spPr>
           <a:xfrm>
             <a:off x="685800" y="2130480"/>
-            <a:ext cx="7771680" cy="1469160"/>
+            <a:ext cx="7771320" cy="1468800"/>
           </a:xfrm>
           <a:prstGeom prst="rect">
             <a:avLst/>
@@ -788,7 +788,7 @@
       </p:grpSpPr>
       <p:sp>
         <p:nvSpPr>
-          <p:cNvPr id="48" name="PlaceHolder 1"/>
+          <p:cNvPr id="46" name="PlaceHolder 1"/>
           <p:cNvSpPr>
             <a:spLocks noGrp="1"/>
           </p:cNvSpPr>
@@ -799,7 +799,7 @@
         <p:spPr>
           <a:xfrm>
             <a:off x="685800" y="2130480"/>
-            <a:ext cx="7771680" cy="6811560"/>
+            <a:ext cx="7771320" cy="6809760"/>
           </a:xfrm>
           <a:prstGeom prst="rect">
             <a:avLst/>
@@ -837,7 +837,7 @@
       </p:grpSpPr>
       <p:sp>
         <p:nvSpPr>
-          <p:cNvPr id="49" name="PlaceHolder 1"/>
+          <p:cNvPr id="47" name="PlaceHolder 1"/>
           <p:cNvSpPr>
             <a:spLocks noGrp="1"/>
           </p:cNvSpPr>
@@ -848,7 +848,7 @@
         <p:spPr>
           <a:xfrm>
             <a:off x="685800" y="2130480"/>
-            <a:ext cx="7771680" cy="1469160"/>
+            <a:ext cx="7771320" cy="1468800"/>
           </a:xfrm>
           <a:prstGeom prst="rect">
             <a:avLst/>
@@ -864,7 +864,7 @@
       </p:sp>
       <p:sp>
         <p:nvSpPr>
-          <p:cNvPr id="50" name="PlaceHolder 2"/>
+          <p:cNvPr id="48" name="PlaceHolder 2"/>
           <p:cNvSpPr>
             <a:spLocks noGrp="1"/>
           </p:cNvSpPr>
@@ -875,7 +875,7 @@
         <p:spPr>
           <a:xfrm>
             <a:off x="1371600" y="3886200"/>
-            <a:ext cx="3123000" cy="835560"/>
+            <a:ext cx="3123000" cy="835200"/>
           </a:xfrm>
           <a:prstGeom prst="rect">
             <a:avLst/>
@@ -890,7 +890,7 @@
       </p:sp>
       <p:sp>
         <p:nvSpPr>
-          <p:cNvPr id="51" name="PlaceHolder 3"/>
+          <p:cNvPr id="49" name="PlaceHolder 3"/>
           <p:cNvSpPr>
             <a:spLocks noGrp="1"/>
           </p:cNvSpPr>
@@ -900,8 +900,8 @@
         </p:nvSpPr>
         <p:spPr>
           <a:xfrm>
-            <a:off x="1371600" y="4801680"/>
-            <a:ext cx="3123000" cy="835560"/>
+            <a:off x="1371600" y="4800960"/>
+            <a:ext cx="3123000" cy="835200"/>
           </a:xfrm>
           <a:prstGeom prst="rect">
             <a:avLst/>
@@ -916,7 +916,7 @@
       </p:sp>
       <p:sp>
         <p:nvSpPr>
-          <p:cNvPr id="52" name="PlaceHolder 4"/>
+          <p:cNvPr id="50" name="PlaceHolder 4"/>
           <p:cNvSpPr>
             <a:spLocks noGrp="1"/>
           </p:cNvSpPr>
@@ -927,7 +927,7 @@
         <p:spPr>
           <a:xfrm>
             <a:off x="4651200" y="3886200"/>
-            <a:ext cx="3123000" cy="1751760"/>
+            <a:ext cx="3123000" cy="1751400"/>
           </a:xfrm>
           <a:prstGeom prst="rect">
             <a:avLst/>
@@ -964,7 +964,7 @@
       </p:grpSpPr>
       <p:sp>
         <p:nvSpPr>
-          <p:cNvPr id="3" name="PlaceHolder 1"/>
+          <p:cNvPr id="2" name="PlaceHolder 1"/>
           <p:cNvSpPr>
             <a:spLocks noGrp="1"/>
           </p:cNvSpPr>
@@ -975,7 +975,7 @@
         <p:spPr>
           <a:xfrm>
             <a:off x="685800" y="2130480"/>
-            <a:ext cx="7771680" cy="1469160"/>
+            <a:ext cx="7771320" cy="1468800"/>
           </a:xfrm>
           <a:prstGeom prst="rect">
             <a:avLst/>
@@ -991,7 +991,7 @@
       </p:sp>
       <p:sp>
         <p:nvSpPr>
-          <p:cNvPr id="4" name="PlaceHolder 2"/>
+          <p:cNvPr id="3" name="PlaceHolder 2"/>
           <p:cNvSpPr>
             <a:spLocks noGrp="1"/>
           </p:cNvSpPr>
@@ -1002,7 +1002,7 @@
         <p:spPr>
           <a:xfrm>
             <a:off x="1371600" y="3886200"/>
-            <a:ext cx="6400080" cy="1751760"/>
+            <a:ext cx="6399720" cy="1751400"/>
           </a:xfrm>
           <a:prstGeom prst="rect">
             <a:avLst/>
@@ -1040,7 +1040,7 @@
       </p:grpSpPr>
       <p:sp>
         <p:nvSpPr>
-          <p:cNvPr id="53" name="PlaceHolder 1"/>
+          <p:cNvPr id="51" name="PlaceHolder 1"/>
           <p:cNvSpPr>
             <a:spLocks noGrp="1"/>
           </p:cNvSpPr>
@@ -1051,7 +1051,7 @@
         <p:spPr>
           <a:xfrm>
             <a:off x="685800" y="2130480"/>
-            <a:ext cx="7771680" cy="1469160"/>
+            <a:ext cx="7771320" cy="1468800"/>
           </a:xfrm>
           <a:prstGeom prst="rect">
             <a:avLst/>
@@ -1067,7 +1067,7 @@
       </p:sp>
       <p:sp>
         <p:nvSpPr>
-          <p:cNvPr id="54" name="PlaceHolder 2"/>
+          <p:cNvPr id="52" name="PlaceHolder 2"/>
           <p:cNvSpPr>
             <a:spLocks noGrp="1"/>
           </p:cNvSpPr>
@@ -1078,7 +1078,7 @@
         <p:spPr>
           <a:xfrm>
             <a:off x="1371600" y="3886200"/>
-            <a:ext cx="3123000" cy="1751760"/>
+            <a:ext cx="3123000" cy="1751400"/>
           </a:xfrm>
           <a:prstGeom prst="rect">
             <a:avLst/>
@@ -1093,7 +1093,7 @@
       </p:sp>
       <p:sp>
         <p:nvSpPr>
-          <p:cNvPr id="55" name="PlaceHolder 3"/>
+          <p:cNvPr id="53" name="PlaceHolder 3"/>
           <p:cNvSpPr>
             <a:spLocks noGrp="1"/>
           </p:cNvSpPr>
@@ -1104,7 +1104,7 @@
         <p:spPr>
           <a:xfrm>
             <a:off x="4651200" y="3886200"/>
-            <a:ext cx="3123000" cy="835560"/>
+            <a:ext cx="3123000" cy="835200"/>
           </a:xfrm>
           <a:prstGeom prst="rect">
             <a:avLst/>
@@ -1119,7 +1119,7 @@
       </p:sp>
       <p:sp>
         <p:nvSpPr>
-          <p:cNvPr id="56" name="PlaceHolder 4"/>
+          <p:cNvPr id="54" name="PlaceHolder 4"/>
           <p:cNvSpPr>
             <a:spLocks noGrp="1"/>
           </p:cNvSpPr>
@@ -1129,8 +1129,8 @@
         </p:nvSpPr>
         <p:spPr>
           <a:xfrm>
-            <a:off x="4651200" y="4801680"/>
-            <a:ext cx="3123000" cy="835560"/>
+            <a:off x="4651200" y="4800960"/>
+            <a:ext cx="3123000" cy="835200"/>
           </a:xfrm>
           <a:prstGeom prst="rect">
             <a:avLst/>
@@ -1167,7 +1167,7 @@
       </p:grpSpPr>
       <p:sp>
         <p:nvSpPr>
-          <p:cNvPr id="57" name="PlaceHolder 1"/>
+          <p:cNvPr id="55" name="PlaceHolder 1"/>
           <p:cNvSpPr>
             <a:spLocks noGrp="1"/>
           </p:cNvSpPr>
@@ -1178,7 +1178,7 @@
         <p:spPr>
           <a:xfrm>
             <a:off x="685800" y="2130480"/>
-            <a:ext cx="7771680" cy="1469160"/>
+            <a:ext cx="7771320" cy="1468800"/>
           </a:xfrm>
           <a:prstGeom prst="rect">
             <a:avLst/>
@@ -1194,7 +1194,7 @@
       </p:sp>
       <p:sp>
         <p:nvSpPr>
-          <p:cNvPr id="58" name="PlaceHolder 2"/>
+          <p:cNvPr id="56" name="PlaceHolder 2"/>
           <p:cNvSpPr>
             <a:spLocks noGrp="1"/>
           </p:cNvSpPr>
@@ -1205,7 +1205,7 @@
         <p:spPr>
           <a:xfrm>
             <a:off x="1371600" y="3886200"/>
-            <a:ext cx="3123000" cy="835560"/>
+            <a:ext cx="3123000" cy="835200"/>
           </a:xfrm>
           <a:prstGeom prst="rect">
             <a:avLst/>
@@ -1220,7 +1220,7 @@
       </p:sp>
       <p:sp>
         <p:nvSpPr>
-          <p:cNvPr id="59" name="PlaceHolder 3"/>
+          <p:cNvPr id="57" name="PlaceHolder 3"/>
           <p:cNvSpPr>
             <a:spLocks noGrp="1"/>
           </p:cNvSpPr>
@@ -1231,7 +1231,7 @@
         <p:spPr>
           <a:xfrm>
             <a:off x="4651200" y="3886200"/>
-            <a:ext cx="3123000" cy="835560"/>
+            <a:ext cx="3123000" cy="835200"/>
           </a:xfrm>
           <a:prstGeom prst="rect">
             <a:avLst/>
@@ -1246,7 +1246,7 @@
       </p:sp>
       <p:sp>
         <p:nvSpPr>
-          <p:cNvPr id="60" name="PlaceHolder 4"/>
+          <p:cNvPr id="58" name="PlaceHolder 4"/>
           <p:cNvSpPr>
             <a:spLocks noGrp="1"/>
           </p:cNvSpPr>
@@ -1256,8 +1256,8 @@
         </p:nvSpPr>
         <p:spPr>
           <a:xfrm>
-            <a:off x="1371600" y="4801680"/>
-            <a:ext cx="6400080" cy="835560"/>
+            <a:off x="1371600" y="4800960"/>
+            <a:ext cx="6399720" cy="835200"/>
           </a:xfrm>
           <a:prstGeom prst="rect">
             <a:avLst/>
@@ -1294,7 +1294,7 @@
       </p:grpSpPr>
       <p:sp>
         <p:nvSpPr>
-          <p:cNvPr id="61" name="PlaceHolder 1"/>
+          <p:cNvPr id="59" name="PlaceHolder 1"/>
           <p:cNvSpPr>
             <a:spLocks noGrp="1"/>
           </p:cNvSpPr>
@@ -1305,7 +1305,7 @@
         <p:spPr>
           <a:xfrm>
             <a:off x="685800" y="2130480"/>
-            <a:ext cx="7771680" cy="1469160"/>
+            <a:ext cx="7771320" cy="1468800"/>
           </a:xfrm>
           <a:prstGeom prst="rect">
             <a:avLst/>
@@ -1321,7 +1321,7 @@
       </p:sp>
       <p:sp>
         <p:nvSpPr>
-          <p:cNvPr id="62" name="PlaceHolder 2"/>
+          <p:cNvPr id="60" name="PlaceHolder 2"/>
           <p:cNvSpPr>
             <a:spLocks noGrp="1"/>
           </p:cNvSpPr>
@@ -1332,7 +1332,7 @@
         <p:spPr>
           <a:xfrm>
             <a:off x="1371600" y="3886200"/>
-            <a:ext cx="6400080" cy="835560"/>
+            <a:ext cx="6399720" cy="835200"/>
           </a:xfrm>
           <a:prstGeom prst="rect">
             <a:avLst/>
@@ -1347,7 +1347,7 @@
       </p:sp>
       <p:sp>
         <p:nvSpPr>
-          <p:cNvPr id="63" name="PlaceHolder 3"/>
+          <p:cNvPr id="61" name="PlaceHolder 3"/>
           <p:cNvSpPr>
             <a:spLocks noGrp="1"/>
           </p:cNvSpPr>
@@ -1357,8 +1357,8 @@
         </p:nvSpPr>
         <p:spPr>
           <a:xfrm>
-            <a:off x="1371600" y="4801680"/>
-            <a:ext cx="6400080" cy="835560"/>
+            <a:off x="1371600" y="4800960"/>
+            <a:ext cx="6399720" cy="835200"/>
           </a:xfrm>
           <a:prstGeom prst="rect">
             <a:avLst/>
@@ -1395,7 +1395,7 @@
       </p:grpSpPr>
       <p:sp>
         <p:nvSpPr>
-          <p:cNvPr id="64" name="PlaceHolder 1"/>
+          <p:cNvPr id="62" name="PlaceHolder 1"/>
           <p:cNvSpPr>
             <a:spLocks noGrp="1"/>
           </p:cNvSpPr>
@@ -1406,7 +1406,7 @@
         <p:spPr>
           <a:xfrm>
             <a:off x="685800" y="2130480"/>
-            <a:ext cx="7771680" cy="1469160"/>
+            <a:ext cx="7771320" cy="1468800"/>
           </a:xfrm>
           <a:prstGeom prst="rect">
             <a:avLst/>
@@ -1422,7 +1422,7 @@
       </p:sp>
       <p:sp>
         <p:nvSpPr>
-          <p:cNvPr id="65" name="PlaceHolder 2"/>
+          <p:cNvPr id="63" name="PlaceHolder 2"/>
           <p:cNvSpPr>
             <a:spLocks noGrp="1"/>
           </p:cNvSpPr>
@@ -1433,7 +1433,7 @@
         <p:spPr>
           <a:xfrm>
             <a:off x="1371600" y="3886200"/>
-            <a:ext cx="3123000" cy="835560"/>
+            <a:ext cx="3123000" cy="835200"/>
           </a:xfrm>
           <a:prstGeom prst="rect">
             <a:avLst/>
@@ -1448,7 +1448,7 @@
       </p:sp>
       <p:sp>
         <p:nvSpPr>
-          <p:cNvPr id="66" name="PlaceHolder 3"/>
+          <p:cNvPr id="64" name="PlaceHolder 3"/>
           <p:cNvSpPr>
             <a:spLocks noGrp="1"/>
           </p:cNvSpPr>
@@ -1459,7 +1459,7 @@
         <p:spPr>
           <a:xfrm>
             <a:off x="4651200" y="3886200"/>
-            <a:ext cx="3123000" cy="835560"/>
+            <a:ext cx="3123000" cy="835200"/>
           </a:xfrm>
           <a:prstGeom prst="rect">
             <a:avLst/>
@@ -1474,7 +1474,7 @@
       </p:sp>
       <p:sp>
         <p:nvSpPr>
-          <p:cNvPr id="67" name="PlaceHolder 4"/>
+          <p:cNvPr id="65" name="PlaceHolder 4"/>
           <p:cNvSpPr>
             <a:spLocks noGrp="1"/>
           </p:cNvSpPr>
@@ -1484,8 +1484,8 @@
         </p:nvSpPr>
         <p:spPr>
           <a:xfrm>
-            <a:off x="4651200" y="4801680"/>
-            <a:ext cx="3123000" cy="835560"/>
+            <a:off x="4651200" y="4800960"/>
+            <a:ext cx="3123000" cy="835200"/>
           </a:xfrm>
           <a:prstGeom prst="rect">
             <a:avLst/>
@@ -1500,7 +1500,7 @@
       </p:sp>
       <p:sp>
         <p:nvSpPr>
-          <p:cNvPr id="68" name="PlaceHolder 5"/>
+          <p:cNvPr id="66" name="PlaceHolder 5"/>
           <p:cNvSpPr>
             <a:spLocks noGrp="1"/>
           </p:cNvSpPr>
@@ -1510,8 +1510,8 @@
         </p:nvSpPr>
         <p:spPr>
           <a:xfrm>
-            <a:off x="1371600" y="4801680"/>
-            <a:ext cx="3123000" cy="835560"/>
+            <a:off x="1371600" y="4800960"/>
+            <a:ext cx="3123000" cy="835200"/>
           </a:xfrm>
           <a:prstGeom prst="rect">
             <a:avLst/>
@@ -1548,7 +1548,7 @@
       </p:grpSpPr>
       <p:sp>
         <p:nvSpPr>
-          <p:cNvPr id="69" name="PlaceHolder 1"/>
+          <p:cNvPr id="67" name="PlaceHolder 1"/>
           <p:cNvSpPr>
             <a:spLocks noGrp="1"/>
           </p:cNvSpPr>
@@ -1559,7 +1559,7 @@
         <p:spPr>
           <a:xfrm>
             <a:off x="685800" y="2130480"/>
-            <a:ext cx="7771680" cy="1469160"/>
+            <a:ext cx="7771320" cy="1468800"/>
           </a:xfrm>
           <a:prstGeom prst="rect">
             <a:avLst/>
@@ -1575,7 +1575,7 @@
       </p:sp>
       <p:sp>
         <p:nvSpPr>
-          <p:cNvPr id="70" name="PlaceHolder 2"/>
+          <p:cNvPr id="68" name="PlaceHolder 2"/>
           <p:cNvSpPr>
             <a:spLocks noGrp="1"/>
           </p:cNvSpPr>
@@ -1586,7 +1586,7 @@
         <p:spPr>
           <a:xfrm>
             <a:off x="1371600" y="3886200"/>
-            <a:ext cx="6400080" cy="1751760"/>
+            <a:ext cx="6399720" cy="1751400"/>
           </a:xfrm>
           <a:prstGeom prst="rect">
             <a:avLst/>
@@ -1601,7 +1601,7 @@
       </p:sp>
       <p:sp>
         <p:nvSpPr>
-          <p:cNvPr id="71" name="PlaceHolder 3"/>
+          <p:cNvPr id="69" name="PlaceHolder 3"/>
           <p:cNvSpPr>
             <a:spLocks noGrp="1"/>
           </p:cNvSpPr>
@@ -1612,7 +1612,7 @@
         <p:spPr>
           <a:xfrm>
             <a:off x="1371600" y="3886200"/>
-            <a:ext cx="6400080" cy="1751760"/>
+            <a:ext cx="6399720" cy="1751400"/>
           </a:xfrm>
           <a:prstGeom prst="rect">
             <a:avLst/>
@@ -1627,7 +1627,7 @@
       </p:sp>
       <p:pic>
         <p:nvPicPr>
-          <p:cNvPr id="72" name="" descr=""/>
+          <p:cNvPr id="70" name="" descr=""/>
           <p:cNvPicPr/>
           <p:nvPr/>
         </p:nvPicPr>
@@ -1637,8 +1637,8 @@
         </p:blipFill>
         <p:spPr>
           <a:xfrm>
-            <a:off x="3474000" y="3886200"/>
-            <a:ext cx="2195280" cy="1751760"/>
+            <a:off x="3473640" y="3885840"/>
+            <a:ext cx="2194920" cy="1751400"/>
           </a:xfrm>
           <a:prstGeom prst="rect">
             <a:avLst/>
@@ -1650,7 +1650,7 @@
       </p:pic>
       <p:pic>
         <p:nvPicPr>
-          <p:cNvPr id="73" name="" descr=""/>
+          <p:cNvPr id="71" name="" descr=""/>
           <p:cNvPicPr/>
           <p:nvPr/>
         </p:nvPicPr>
@@ -1660,8 +1660,8 @@
         </p:blipFill>
         <p:spPr>
           <a:xfrm>
-            <a:off x="3474000" y="3886200"/>
-            <a:ext cx="2195280" cy="1751760"/>
+            <a:off x="3473640" y="3885840"/>
+            <a:ext cx="2194920" cy="1751400"/>
           </a:xfrm>
           <a:prstGeom prst="rect">
             <a:avLst/>
@@ -1695,7 +1695,7 @@
       </p:grpSpPr>
       <p:sp>
         <p:nvSpPr>
-          <p:cNvPr id="5" name="PlaceHolder 1"/>
+          <p:cNvPr id="4" name="PlaceHolder 1"/>
           <p:cNvSpPr>
             <a:spLocks noGrp="1"/>
           </p:cNvSpPr>
@@ -1706,7 +1706,7 @@
         <p:spPr>
           <a:xfrm>
             <a:off x="685800" y="2130480"/>
-            <a:ext cx="7771680" cy="1469160"/>
+            <a:ext cx="7771320" cy="1468800"/>
           </a:xfrm>
           <a:prstGeom prst="rect">
             <a:avLst/>
@@ -1722,7 +1722,7 @@
       </p:sp>
       <p:sp>
         <p:nvSpPr>
-          <p:cNvPr id="6" name="PlaceHolder 2"/>
+          <p:cNvPr id="5" name="PlaceHolder 2"/>
           <p:cNvSpPr>
             <a:spLocks noGrp="1"/>
           </p:cNvSpPr>
@@ -1733,7 +1733,7 @@
         <p:spPr>
           <a:xfrm>
             <a:off x="1371600" y="3886200"/>
-            <a:ext cx="6400080" cy="1751760"/>
+            <a:ext cx="6399720" cy="1751400"/>
           </a:xfrm>
           <a:prstGeom prst="rect">
             <a:avLst/>
@@ -1770,7 +1770,7 @@
       </p:grpSpPr>
       <p:sp>
         <p:nvSpPr>
-          <p:cNvPr id="7" name="PlaceHolder 1"/>
+          <p:cNvPr id="6" name="PlaceHolder 1"/>
           <p:cNvSpPr>
             <a:spLocks noGrp="1"/>
           </p:cNvSpPr>
@@ -1781,7 +1781,7 @@
         <p:spPr>
           <a:xfrm>
             <a:off x="685800" y="2130480"/>
-            <a:ext cx="7771680" cy="1469160"/>
+            <a:ext cx="7771320" cy="1468800"/>
           </a:xfrm>
           <a:prstGeom prst="rect">
             <a:avLst/>
@@ -1797,7 +1797,7 @@
       </p:sp>
       <p:sp>
         <p:nvSpPr>
-          <p:cNvPr id="8" name="PlaceHolder 2"/>
+          <p:cNvPr id="7" name="PlaceHolder 2"/>
           <p:cNvSpPr>
             <a:spLocks noGrp="1"/>
           </p:cNvSpPr>
@@ -1808,7 +1808,7 @@
         <p:spPr>
           <a:xfrm>
             <a:off x="1371600" y="3886200"/>
-            <a:ext cx="3123000" cy="1751760"/>
+            <a:ext cx="3123000" cy="1751400"/>
           </a:xfrm>
           <a:prstGeom prst="rect">
             <a:avLst/>
@@ -1823,7 +1823,7 @@
       </p:sp>
       <p:sp>
         <p:nvSpPr>
-          <p:cNvPr id="9" name="PlaceHolder 3"/>
+          <p:cNvPr id="8" name="PlaceHolder 3"/>
           <p:cNvSpPr>
             <a:spLocks noGrp="1"/>
           </p:cNvSpPr>
@@ -1834,7 +1834,7 @@
         <p:spPr>
           <a:xfrm>
             <a:off x="4651200" y="3886200"/>
-            <a:ext cx="3123000" cy="1751760"/>
+            <a:ext cx="3123000" cy="1751400"/>
           </a:xfrm>
           <a:prstGeom prst="rect">
             <a:avLst/>
@@ -1871,7 +1871,7 @@
       </p:grpSpPr>
       <p:sp>
         <p:nvSpPr>
-          <p:cNvPr id="10" name="PlaceHolder 1"/>
+          <p:cNvPr id="9" name="PlaceHolder 1"/>
           <p:cNvSpPr>
             <a:spLocks noGrp="1"/>
           </p:cNvSpPr>
@@ -1882,7 +1882,7 @@
         <p:spPr>
           <a:xfrm>
             <a:off x="685800" y="2130480"/>
-            <a:ext cx="7771680" cy="1469160"/>
+            <a:ext cx="7771320" cy="1468800"/>
           </a:xfrm>
           <a:prstGeom prst="rect">
             <a:avLst/>
@@ -1920,7 +1920,7 @@
       </p:grpSpPr>
       <p:sp>
         <p:nvSpPr>
-          <p:cNvPr id="11" name="PlaceHolder 1"/>
+          <p:cNvPr id="10" name="PlaceHolder 1"/>
           <p:cNvSpPr>
             <a:spLocks noGrp="1"/>
           </p:cNvSpPr>
@@ -1931,7 +1931,7 @@
         <p:spPr>
           <a:xfrm>
             <a:off x="685800" y="2130480"/>
-            <a:ext cx="7771680" cy="6811560"/>
+            <a:ext cx="7771320" cy="6809760"/>
           </a:xfrm>
           <a:prstGeom prst="rect">
             <a:avLst/>
@@ -1969,7 +1969,7 @@
       </p:grpSpPr>
       <p:sp>
         <p:nvSpPr>
-          <p:cNvPr id="12" name="PlaceHolder 1"/>
+          <p:cNvPr id="11" name="PlaceHolder 1"/>
           <p:cNvSpPr>
             <a:spLocks noGrp="1"/>
           </p:cNvSpPr>
@@ -1980,7 +1980,7 @@
         <p:spPr>
           <a:xfrm>
             <a:off x="685800" y="2130480"/>
-            <a:ext cx="7771680" cy="1469160"/>
+            <a:ext cx="7771320" cy="1468800"/>
           </a:xfrm>
           <a:prstGeom prst="rect">
             <a:avLst/>
@@ -1996,7 +1996,7 @@
       </p:sp>
       <p:sp>
         <p:nvSpPr>
-          <p:cNvPr id="13" name="PlaceHolder 2"/>
+          <p:cNvPr id="12" name="PlaceHolder 2"/>
           <p:cNvSpPr>
             <a:spLocks noGrp="1"/>
           </p:cNvSpPr>
@@ -2007,7 +2007,7 @@
         <p:spPr>
           <a:xfrm>
             <a:off x="1371600" y="3886200"/>
-            <a:ext cx="3123000" cy="835560"/>
+            <a:ext cx="3123000" cy="835200"/>
           </a:xfrm>
           <a:prstGeom prst="rect">
             <a:avLst/>
@@ -2022,7 +2022,7 @@
       </p:sp>
       <p:sp>
         <p:nvSpPr>
-          <p:cNvPr id="14" name="PlaceHolder 3"/>
+          <p:cNvPr id="13" name="PlaceHolder 3"/>
           <p:cNvSpPr>
             <a:spLocks noGrp="1"/>
           </p:cNvSpPr>
@@ -2032,8 +2032,8 @@
         </p:nvSpPr>
         <p:spPr>
           <a:xfrm>
-            <a:off x="1371600" y="4801680"/>
-            <a:ext cx="3123000" cy="835560"/>
+            <a:off x="1371600" y="4800960"/>
+            <a:ext cx="3123000" cy="835200"/>
           </a:xfrm>
           <a:prstGeom prst="rect">
             <a:avLst/>
@@ -2048,7 +2048,7 @@
       </p:sp>
       <p:sp>
         <p:nvSpPr>
-          <p:cNvPr id="15" name="PlaceHolder 4"/>
+          <p:cNvPr id="14" name="PlaceHolder 4"/>
           <p:cNvSpPr>
             <a:spLocks noGrp="1"/>
           </p:cNvSpPr>
@@ -2059,7 +2059,7 @@
         <p:spPr>
           <a:xfrm>
             <a:off x="4651200" y="3886200"/>
-            <a:ext cx="3123000" cy="1751760"/>
+            <a:ext cx="3123000" cy="1751400"/>
           </a:xfrm>
           <a:prstGeom prst="rect">
             <a:avLst/>
@@ -2096,7 +2096,7 @@
       </p:grpSpPr>
       <p:sp>
         <p:nvSpPr>
-          <p:cNvPr id="16" name="PlaceHolder 1"/>
+          <p:cNvPr id="15" name="PlaceHolder 1"/>
           <p:cNvSpPr>
             <a:spLocks noGrp="1"/>
           </p:cNvSpPr>
@@ -2107,7 +2107,7 @@
         <p:spPr>
           <a:xfrm>
             <a:off x="685800" y="2130480"/>
-            <a:ext cx="7771680" cy="1469160"/>
+            <a:ext cx="7771320" cy="1468800"/>
           </a:xfrm>
           <a:prstGeom prst="rect">
             <a:avLst/>
@@ -2123,7 +2123,7 @@
       </p:sp>
       <p:sp>
         <p:nvSpPr>
-          <p:cNvPr id="17" name="PlaceHolder 2"/>
+          <p:cNvPr id="16" name="PlaceHolder 2"/>
           <p:cNvSpPr>
             <a:spLocks noGrp="1"/>
           </p:cNvSpPr>
@@ -2134,7 +2134,7 @@
         <p:spPr>
           <a:xfrm>
             <a:off x="1371600" y="3886200"/>
-            <a:ext cx="3123000" cy="1751760"/>
+            <a:ext cx="3123000" cy="1751400"/>
           </a:xfrm>
           <a:prstGeom prst="rect">
             <a:avLst/>
@@ -2149,7 +2149,7 @@
       </p:sp>
       <p:sp>
         <p:nvSpPr>
-          <p:cNvPr id="18" name="PlaceHolder 3"/>
+          <p:cNvPr id="17" name="PlaceHolder 3"/>
           <p:cNvSpPr>
             <a:spLocks noGrp="1"/>
           </p:cNvSpPr>
@@ -2160,7 +2160,7 @@
         <p:spPr>
           <a:xfrm>
             <a:off x="4651200" y="3886200"/>
-            <a:ext cx="3123000" cy="835560"/>
+            <a:ext cx="3123000" cy="835200"/>
           </a:xfrm>
           <a:prstGeom prst="rect">
             <a:avLst/>
@@ -2175,7 +2175,7 @@
       </p:sp>
       <p:sp>
         <p:nvSpPr>
-          <p:cNvPr id="19" name="PlaceHolder 4"/>
+          <p:cNvPr id="18" name="PlaceHolder 4"/>
           <p:cNvSpPr>
             <a:spLocks noGrp="1"/>
           </p:cNvSpPr>
@@ -2185,8 +2185,8 @@
         </p:nvSpPr>
         <p:spPr>
           <a:xfrm>
-            <a:off x="4651200" y="4801680"/>
-            <a:ext cx="3123000" cy="835560"/>
+            <a:off x="4651200" y="4800960"/>
+            <a:ext cx="3123000" cy="835200"/>
           </a:xfrm>
           <a:prstGeom prst="rect">
             <a:avLst/>
@@ -2223,7 +2223,7 @@
       </p:grpSpPr>
       <p:sp>
         <p:nvSpPr>
-          <p:cNvPr id="20" name="PlaceHolder 1"/>
+          <p:cNvPr id="19" name="PlaceHolder 1"/>
           <p:cNvSpPr>
             <a:spLocks noGrp="1"/>
           </p:cNvSpPr>
@@ -2234,7 +2234,7 @@
         <p:spPr>
           <a:xfrm>
             <a:off x="685800" y="2130480"/>
-            <a:ext cx="7771680" cy="1469160"/>
+            <a:ext cx="7771320" cy="1468800"/>
           </a:xfrm>
           <a:prstGeom prst="rect">
             <a:avLst/>
@@ -2250,7 +2250,7 @@
       </p:sp>
       <p:sp>
         <p:nvSpPr>
-          <p:cNvPr id="21" name="PlaceHolder 2"/>
+          <p:cNvPr id="20" name="PlaceHolder 2"/>
           <p:cNvSpPr>
             <a:spLocks noGrp="1"/>
           </p:cNvSpPr>
@@ -2261,7 +2261,7 @@
         <p:spPr>
           <a:xfrm>
             <a:off x="1371600" y="3886200"/>
-            <a:ext cx="3123000" cy="835560"/>
+            <a:ext cx="3123000" cy="835200"/>
           </a:xfrm>
           <a:prstGeom prst="rect">
             <a:avLst/>
@@ -2276,7 +2276,7 @@
       </p:sp>
       <p:sp>
         <p:nvSpPr>
-          <p:cNvPr id="22" name="PlaceHolder 3"/>
+          <p:cNvPr id="21" name="PlaceHolder 3"/>
           <p:cNvSpPr>
             <a:spLocks noGrp="1"/>
           </p:cNvSpPr>
@@ -2287,7 +2287,7 @@
         <p:spPr>
           <a:xfrm>
             <a:off x="4651200" y="3886200"/>
-            <a:ext cx="3123000" cy="835560"/>
+            <a:ext cx="3123000" cy="835200"/>
           </a:xfrm>
           <a:prstGeom prst="rect">
             <a:avLst/>
@@ -2302,7 +2302,7 @@
       </p:sp>
       <p:sp>
         <p:nvSpPr>
-          <p:cNvPr id="23" name="PlaceHolder 4"/>
+          <p:cNvPr id="22" name="PlaceHolder 4"/>
           <p:cNvSpPr>
             <a:spLocks noGrp="1"/>
           </p:cNvSpPr>
@@ -2312,8 +2312,8 @@
         </p:nvSpPr>
         <p:spPr>
           <a:xfrm>
-            <a:off x="1371600" y="4801680"/>
-            <a:ext cx="6400080" cy="835560"/>
+            <a:off x="1371600" y="4800960"/>
+            <a:ext cx="6399720" cy="835200"/>
           </a:xfrm>
           <a:prstGeom prst="rect">
             <a:avLst/>
@@ -2368,7 +2368,7 @@
         <p:spPr>
           <a:xfrm>
             <a:off x="685800" y="2130480"/>
-            <a:ext cx="7771680" cy="1469160"/>
+            <a:ext cx="7771320" cy="1468800"/>
           </a:xfrm>
           <a:prstGeom prst="rect">
             <a:avLst/>
@@ -2385,33 +2385,6 @@
       <p:sp>
         <p:nvSpPr>
           <p:cNvPr id="1" name="PlaceHolder 2"/>
-          <p:cNvSpPr>
-            <a:spLocks noGrp="1"/>
-          </p:cNvSpPr>
-          <p:nvPr>
-            <p:ph type="subTitle"/>
-          </p:nvPr>
-        </p:nvSpPr>
-        <p:spPr>
-          <a:xfrm>
-            <a:off x="1371600" y="3886200"/>
-            <a:ext cx="6400080" cy="1751760"/>
-          </a:xfrm>
-          <a:prstGeom prst="rect">
-            <a:avLst/>
-          </a:prstGeom>
-        </p:spPr>
-        <p:txBody>
-          <a:bodyPr lIns="0" rIns="0" tIns="0" bIns="0" anchor="ctr"/>
-          <a:p>
-            <a:pPr algn="ctr"/>
-            <a:endParaRPr/>
-          </a:p>
-        </p:txBody>
-      </p:sp>
-      <p:sp>
-        <p:nvSpPr>
-          <p:cNvPr id="2" name="PlaceHolder 3"/>
           <p:cNvSpPr>
             <a:spLocks noGrp="1"/>
           </p:cNvSpPr>
@@ -2421,8 +2394,8 @@
         </p:nvSpPr>
         <p:spPr>
           <a:xfrm>
-            <a:off x="457200" y="1604520"/>
-            <a:ext cx="8229240" cy="3977280"/>
+            <a:off x="1371600" y="3886200"/>
+            <a:ext cx="6399720" cy="1751400"/>
           </a:xfrm>
           <a:prstGeom prst="rect">
             <a:avLst/>
@@ -2437,7 +2410,7 @@
               <a:buChar char=""/>
             </a:pPr>
             <a:r>
-              <a:rPr lang="en-US" sz="3200">
+              <a:rPr lang="en-US">
                 <a:latin typeface="DejaVu Sans"/>
               </a:rPr>
               <a:t>Click to edit the outline text format</a:t>
@@ -2451,7 +2424,7 @@
               <a:buChar char=""/>
             </a:pPr>
             <a:r>
-              <a:rPr lang="en-US" sz="2800">
+              <a:rPr lang="en-US">
                 <a:latin typeface="DejaVu Sans"/>
               </a:rPr>
               <a:t>Second Outline Level</a:t>
@@ -2465,7 +2438,7 @@
               <a:buChar char=""/>
             </a:pPr>
             <a:r>
-              <a:rPr lang="en-US" sz="2400">
+              <a:rPr lang="en-US">
                 <a:latin typeface="DejaVu Sans"/>
               </a:rPr>
               <a:t>Third Outline Level</a:t>
@@ -2479,7 +2452,7 @@
               <a:buChar char=""/>
             </a:pPr>
             <a:r>
-              <a:rPr lang="en-US" sz="2000">
+              <a:rPr lang="en-US">
                 <a:latin typeface="DejaVu Sans"/>
               </a:rPr>
               <a:t>Fourth Outline Level</a:t>
@@ -2493,7 +2466,7 @@
               <a:buChar char=""/>
             </a:pPr>
             <a:r>
-              <a:rPr lang="en-US" sz="2000">
+              <a:rPr lang="en-US">
                 <a:latin typeface="DejaVu Sans"/>
               </a:rPr>
               <a:t>Fifth Outline Level</a:t>
@@ -2507,7 +2480,7 @@
               <a:buChar char=""/>
             </a:pPr>
             <a:r>
-              <a:rPr lang="en-US" sz="2000">
+              <a:rPr lang="en-US">
                 <a:latin typeface="DejaVu Sans"/>
               </a:rPr>
               <a:t>Sixth Outline Level</a:t>
@@ -2521,7 +2494,7 @@
               <a:buChar char=""/>
             </a:pPr>
             <a:r>
-              <a:rPr lang="en-US" sz="2000">
+              <a:rPr lang="en-US">
                 <a:latin typeface="DejaVu Sans"/>
               </a:rPr>
               <a:t>Seventh Outline Level</a:t>
@@ -2576,7 +2549,7 @@
       </p:grpSpPr>
       <p:sp>
         <p:nvSpPr>
-          <p:cNvPr id="37" name="PlaceHolder 1"/>
+          <p:cNvPr id="36" name="PlaceHolder 1"/>
           <p:cNvSpPr>
             <a:spLocks noGrp="1"/>
           </p:cNvSpPr>
@@ -2587,7 +2560,7 @@
         <p:spPr>
           <a:xfrm>
             <a:off x="685800" y="2130480"/>
-            <a:ext cx="7771680" cy="1469160"/>
+            <a:ext cx="7771320" cy="1468800"/>
           </a:xfrm>
           <a:prstGeom prst="rect">
             <a:avLst/>
@@ -2603,34 +2576,7 @@
       </p:sp>
       <p:sp>
         <p:nvSpPr>
-          <p:cNvPr id="38" name="PlaceHolder 2"/>
-          <p:cNvSpPr>
-            <a:spLocks noGrp="1"/>
-          </p:cNvSpPr>
-          <p:nvPr>
-            <p:ph type="subTitle"/>
-          </p:nvPr>
-        </p:nvSpPr>
-        <p:spPr>
-          <a:xfrm>
-            <a:off x="1371600" y="3886200"/>
-            <a:ext cx="6400080" cy="1751760"/>
-          </a:xfrm>
-          <a:prstGeom prst="rect">
-            <a:avLst/>
-          </a:prstGeom>
-        </p:spPr>
-        <p:txBody>
-          <a:bodyPr lIns="0" rIns="0" tIns="0" bIns="0" anchor="ctr"/>
-          <a:p>
-            <a:pPr algn="ctr"/>
-            <a:endParaRPr/>
-          </a:p>
-        </p:txBody>
-      </p:sp>
-      <p:sp>
-        <p:nvSpPr>
-          <p:cNvPr id="39" name="PlaceHolder 3"/>
+          <p:cNvPr id="37" name="PlaceHolder 2"/>
           <p:cNvSpPr>
             <a:spLocks noGrp="1"/>
           </p:cNvSpPr>
@@ -2640,8 +2586,8 @@
         </p:nvSpPr>
         <p:spPr>
           <a:xfrm>
-            <a:off x="457200" y="1604520"/>
-            <a:ext cx="8229240" cy="3977280"/>
+            <a:off x="1371600" y="3886200"/>
+            <a:ext cx="6399720" cy="1751400"/>
           </a:xfrm>
           <a:prstGeom prst="rect">
             <a:avLst/>
@@ -2656,7 +2602,7 @@
               <a:buChar char=""/>
             </a:pPr>
             <a:r>
-              <a:rPr lang="en-US" sz="3200">
+              <a:rPr lang="en-US">
                 <a:latin typeface="DejaVu Sans"/>
               </a:rPr>
               <a:t>Click to edit the outline text format</a:t>
@@ -2670,7 +2616,7 @@
               <a:buChar char=""/>
             </a:pPr>
             <a:r>
-              <a:rPr lang="en-US" sz="2800">
+              <a:rPr lang="en-US">
                 <a:latin typeface="DejaVu Sans"/>
               </a:rPr>
               <a:t>Second Outline Level</a:t>
@@ -2684,7 +2630,7 @@
               <a:buChar char=""/>
             </a:pPr>
             <a:r>
-              <a:rPr lang="en-US" sz="2400">
+              <a:rPr lang="en-US">
                 <a:latin typeface="DejaVu Sans"/>
               </a:rPr>
               <a:t>Third Outline Level</a:t>
@@ -2698,7 +2644,7 @@
               <a:buChar char=""/>
             </a:pPr>
             <a:r>
-              <a:rPr lang="en-US" sz="2000">
+              <a:rPr lang="en-US">
                 <a:latin typeface="DejaVu Sans"/>
               </a:rPr>
               <a:t>Fourth Outline Level</a:t>
@@ -2712,7 +2658,7 @@
               <a:buChar char=""/>
             </a:pPr>
             <a:r>
-              <a:rPr lang="en-US" sz="2000">
+              <a:rPr lang="en-US">
                 <a:latin typeface="DejaVu Sans"/>
               </a:rPr>
               <a:t>Fifth Outline Level</a:t>
@@ -2726,7 +2672,7 @@
               <a:buChar char=""/>
             </a:pPr>
             <a:r>
-              <a:rPr lang="en-US" sz="2000">
+              <a:rPr lang="en-US">
                 <a:latin typeface="DejaVu Sans"/>
               </a:rPr>
               <a:t>Sixth Outline Level</a:t>
@@ -2740,7 +2686,7 @@
               <a:buChar char=""/>
             </a:pPr>
             <a:r>
-              <a:rPr lang="en-US" sz="2000">
+              <a:rPr lang="en-US">
                 <a:latin typeface="DejaVu Sans"/>
               </a:rPr>
               <a:t>Seventh Outline Level</a:t>
@@ -2788,7 +2734,7 @@
       </p:grpSpPr>
       <p:sp>
         <p:nvSpPr>
-          <p:cNvPr id="74" name="Line 1"/>
+          <p:cNvPr id="72" name="Line 1"/>
           <p:cNvSpPr/>
           <p:nvPr/>
         </p:nvSpPr>
@@ -2809,7 +2755,7 @@
       </p:sp>
       <p:pic>
         <p:nvPicPr>
-          <p:cNvPr id="75" name="Picture 5" descr=""/>
+          <p:cNvPr id="73" name="Picture 5" descr=""/>
           <p:cNvPicPr/>
           <p:nvPr/>
         </p:nvPicPr>
@@ -2820,7 +2766,7 @@
         <p:spPr>
           <a:xfrm>
             <a:off x="0" y="0"/>
-            <a:ext cx="1150920" cy="843120"/>
+            <a:ext cx="1150560" cy="842760"/>
           </a:xfrm>
           <a:prstGeom prst="rect">
             <a:avLst/>
@@ -2832,14 +2778,14 @@
       </p:pic>
       <p:sp>
         <p:nvSpPr>
-          <p:cNvPr id="76" name="CustomShape 2"/>
+          <p:cNvPr id="74" name="CustomShape 2"/>
           <p:cNvSpPr/>
           <p:nvPr/>
         </p:nvSpPr>
         <p:spPr>
           <a:xfrm>
             <a:off x="1151640" y="2160"/>
-            <a:ext cx="7991640" cy="831240"/>
+            <a:ext cx="7991280" cy="830880"/>
           </a:xfrm>
           <a:prstGeom prst="rect">
             <a:avLst/>
@@ -2876,7 +2822,7 @@
       </p:sp>
       <p:pic>
         <p:nvPicPr>
-          <p:cNvPr id="77" name="Picture 7" descr=""/>
+          <p:cNvPr id="75" name="Picture 7" descr=""/>
           <p:cNvPicPr/>
           <p:nvPr/>
         </p:nvPicPr>
@@ -2887,7 +2833,7 @@
         <p:spPr>
           <a:xfrm>
             <a:off x="8310960" y="2160"/>
-            <a:ext cx="832320" cy="832320"/>
+            <a:ext cx="831960" cy="831960"/>
           </a:xfrm>
           <a:prstGeom prst="rect">
             <a:avLst/>
@@ -2899,14 +2845,14 @@
       </p:pic>
       <p:sp>
         <p:nvSpPr>
-          <p:cNvPr id="78" name="CustomShape 3"/>
+          <p:cNvPr id="76" name="CustomShape 3"/>
           <p:cNvSpPr/>
           <p:nvPr/>
         </p:nvSpPr>
         <p:spPr>
           <a:xfrm>
             <a:off x="1202040" y="188640"/>
-            <a:ext cx="6982560" cy="455760"/>
+            <a:ext cx="6982200" cy="455400"/>
           </a:xfrm>
           <a:prstGeom prst="rect">
             <a:avLst/>
@@ -2946,13 +2892,13 @@
       </p:sp>
       <p:graphicFrame>
         <p:nvGraphicFramePr>
-          <p:cNvPr id="79" name="Table 4"/>
+          <p:cNvPr id="77" name="Table 4"/>
           <p:cNvGraphicFramePr/>
           <p:nvPr/>
         </p:nvGraphicFramePr>
         <p:xfrm>
           <a:off x="480960" y="1035000"/>
-          <a:ext cx="8228520" cy="3311280"/>
+          <a:ext cx="8228520" cy="5469840"/>
         </p:xfrm>
         <a:graphic>
           <a:graphicData uri="http://schemas.openxmlformats.org/drawingml/2006/table">
@@ -3296,13 +3242,13 @@
       </p:graphicFrame>
       <p:graphicFrame>
         <p:nvGraphicFramePr>
-          <p:cNvPr id="80" name="Table 5"/>
+          <p:cNvPr id="78" name="Table 5"/>
           <p:cNvGraphicFramePr/>
           <p:nvPr/>
         </p:nvGraphicFramePr>
         <p:xfrm>
           <a:off x="414000" y="4346280"/>
-          <a:ext cx="8412120" cy="1199880"/>
+          <a:ext cx="8412120" cy="2366640"/>
         </p:xfrm>
         <a:graphic>
           <a:graphicData uri="http://schemas.openxmlformats.org/drawingml/2006/table">
@@ -3625,7 +3571,7 @@
       </p:grpSpPr>
       <p:sp>
         <p:nvSpPr>
-          <p:cNvPr id="137" name="Line 1"/>
+          <p:cNvPr id="135" name="Line 1"/>
           <p:cNvSpPr/>
           <p:nvPr/>
         </p:nvSpPr>
@@ -3646,7 +3592,7 @@
       </p:sp>
       <p:pic>
         <p:nvPicPr>
-          <p:cNvPr id="138" name="Picture 5" descr=""/>
+          <p:cNvPr id="136" name="Picture 5" descr=""/>
           <p:cNvPicPr/>
           <p:nvPr/>
         </p:nvPicPr>
@@ -3657,7 +3603,7 @@
         <p:spPr>
           <a:xfrm>
             <a:off x="0" y="0"/>
-            <a:ext cx="1150920" cy="843120"/>
+            <a:ext cx="1150560" cy="842760"/>
           </a:xfrm>
           <a:prstGeom prst="rect">
             <a:avLst/>
@@ -3669,14 +3615,14 @@
       </p:pic>
       <p:sp>
         <p:nvSpPr>
-          <p:cNvPr id="139" name="CustomShape 2"/>
+          <p:cNvPr id="137" name="CustomShape 2"/>
           <p:cNvSpPr/>
           <p:nvPr/>
         </p:nvSpPr>
         <p:spPr>
           <a:xfrm>
             <a:off x="1151640" y="2160"/>
-            <a:ext cx="7991640" cy="831240"/>
+            <a:ext cx="7991280" cy="830880"/>
           </a:xfrm>
           <a:prstGeom prst="rect">
             <a:avLst/>
@@ -3713,7 +3659,7 @@
       </p:sp>
       <p:pic>
         <p:nvPicPr>
-          <p:cNvPr id="140" name="Picture 7" descr=""/>
+          <p:cNvPr id="138" name="Picture 7" descr=""/>
           <p:cNvPicPr/>
           <p:nvPr/>
         </p:nvPicPr>
@@ -3724,7 +3670,7 @@
         <p:spPr>
           <a:xfrm>
             <a:off x="8310960" y="2160"/>
-            <a:ext cx="832320" cy="832320"/>
+            <a:ext cx="831960" cy="831960"/>
           </a:xfrm>
           <a:prstGeom prst="rect">
             <a:avLst/>
@@ -3736,14 +3682,14 @@
       </p:pic>
       <p:sp>
         <p:nvSpPr>
-          <p:cNvPr id="141" name="CustomShape 3"/>
+          <p:cNvPr id="139" name="CustomShape 3"/>
           <p:cNvSpPr/>
           <p:nvPr/>
         </p:nvSpPr>
         <p:spPr>
           <a:xfrm>
             <a:off x="1202040" y="188640"/>
-            <a:ext cx="6982560" cy="455760"/>
+            <a:ext cx="6982200" cy="455400"/>
           </a:xfrm>
           <a:prstGeom prst="rect">
             <a:avLst/>
@@ -3783,7 +3729,7 @@
       </p:sp>
       <p:pic>
         <p:nvPicPr>
-          <p:cNvPr id="142" name="" descr=""/>
+          <p:cNvPr id="140" name="" descr=""/>
           <p:cNvPicPr/>
           <p:nvPr/>
         </p:nvPicPr>
@@ -3794,7 +3740,7 @@
         <p:spPr>
           <a:xfrm>
             <a:off x="1645920" y="1623960"/>
-            <a:ext cx="5956200" cy="2856240"/>
+            <a:ext cx="5955840" cy="2855880"/>
           </a:xfrm>
           <a:prstGeom prst="rect">
             <a:avLst/>
@@ -3855,7 +3801,7 @@
       </p:grpSpPr>
       <p:sp>
         <p:nvSpPr>
-          <p:cNvPr id="143" name="Line 1"/>
+          <p:cNvPr id="141" name="Line 1"/>
           <p:cNvSpPr/>
           <p:nvPr/>
         </p:nvSpPr>
@@ -3876,7 +3822,7 @@
       </p:sp>
       <p:pic>
         <p:nvPicPr>
-          <p:cNvPr id="144" name="Picture 5" descr=""/>
+          <p:cNvPr id="142" name="Picture 5" descr=""/>
           <p:cNvPicPr/>
           <p:nvPr/>
         </p:nvPicPr>
@@ -3887,7 +3833,7 @@
         <p:spPr>
           <a:xfrm>
             <a:off x="0" y="0"/>
-            <a:ext cx="1150920" cy="843120"/>
+            <a:ext cx="1150560" cy="842760"/>
           </a:xfrm>
           <a:prstGeom prst="rect">
             <a:avLst/>
@@ -3899,14 +3845,14 @@
       </p:pic>
       <p:sp>
         <p:nvSpPr>
-          <p:cNvPr id="145" name="CustomShape 2"/>
+          <p:cNvPr id="143" name="CustomShape 2"/>
           <p:cNvSpPr/>
           <p:nvPr/>
         </p:nvSpPr>
         <p:spPr>
           <a:xfrm>
             <a:off x="1151640" y="2160"/>
-            <a:ext cx="7991640" cy="831240"/>
+            <a:ext cx="7991280" cy="830880"/>
           </a:xfrm>
           <a:prstGeom prst="rect">
             <a:avLst/>
@@ -3943,7 +3889,7 @@
       </p:sp>
       <p:pic>
         <p:nvPicPr>
-          <p:cNvPr id="146" name="Picture 7" descr=""/>
+          <p:cNvPr id="144" name="Picture 7" descr=""/>
           <p:cNvPicPr/>
           <p:nvPr/>
         </p:nvPicPr>
@@ -3954,7 +3900,7 @@
         <p:spPr>
           <a:xfrm>
             <a:off x="8310960" y="2160"/>
-            <a:ext cx="832320" cy="832320"/>
+            <a:ext cx="831960" cy="831960"/>
           </a:xfrm>
           <a:prstGeom prst="rect">
             <a:avLst/>
@@ -3966,14 +3912,14 @@
       </p:pic>
       <p:sp>
         <p:nvSpPr>
-          <p:cNvPr id="147" name="CustomShape 3"/>
+          <p:cNvPr id="145" name="CustomShape 3"/>
           <p:cNvSpPr/>
           <p:nvPr/>
         </p:nvSpPr>
         <p:spPr>
           <a:xfrm>
             <a:off x="1202040" y="188640"/>
-            <a:ext cx="6982560" cy="455760"/>
+            <a:ext cx="6982200" cy="455400"/>
           </a:xfrm>
           <a:prstGeom prst="rect">
             <a:avLst/>
@@ -4013,7 +3959,7 @@
       </p:sp>
       <p:graphicFrame>
         <p:nvGraphicFramePr>
-          <p:cNvPr id="148" name="Table 4"/>
+          <p:cNvPr id="146" name="Table 4"/>
           <p:cNvGraphicFramePr/>
           <p:nvPr/>
         </p:nvGraphicFramePr>
@@ -4362,13 +4308,13 @@
       </p:graphicFrame>
       <p:graphicFrame>
         <p:nvGraphicFramePr>
-          <p:cNvPr id="149" name="Table 5"/>
+          <p:cNvPr id="147" name="Table 5"/>
           <p:cNvGraphicFramePr/>
           <p:nvPr/>
         </p:nvGraphicFramePr>
         <p:xfrm>
           <a:off x="414000" y="4346280"/>
-          <a:ext cx="8272440" cy="1199880"/>
+          <a:ext cx="8272440" cy="1740240"/>
         </p:xfrm>
         <a:graphic>
           <a:graphicData uri="http://schemas.openxmlformats.org/drawingml/2006/table">
@@ -4642,7 +4588,7 @@
       </p:grpSpPr>
       <p:sp>
         <p:nvSpPr>
-          <p:cNvPr id="81" name="Line 1"/>
+          <p:cNvPr id="79" name="Line 1"/>
           <p:cNvSpPr/>
           <p:nvPr/>
         </p:nvSpPr>
@@ -4663,7 +4609,7 @@
       </p:sp>
       <p:pic>
         <p:nvPicPr>
-          <p:cNvPr id="82" name="Picture 5" descr=""/>
+          <p:cNvPr id="80" name="Picture 5" descr=""/>
           <p:cNvPicPr/>
           <p:nvPr/>
         </p:nvPicPr>
@@ -4674,7 +4620,7 @@
         <p:spPr>
           <a:xfrm>
             <a:off x="0" y="0"/>
-            <a:ext cx="1150920" cy="843120"/>
+            <a:ext cx="1150560" cy="842760"/>
           </a:xfrm>
           <a:prstGeom prst="rect">
             <a:avLst/>
@@ -4686,14 +4632,14 @@
       </p:pic>
       <p:sp>
         <p:nvSpPr>
-          <p:cNvPr id="83" name="CustomShape 2"/>
+          <p:cNvPr id="81" name="CustomShape 2"/>
           <p:cNvSpPr/>
           <p:nvPr/>
         </p:nvSpPr>
         <p:spPr>
           <a:xfrm>
             <a:off x="1151640" y="2160"/>
-            <a:ext cx="7991640" cy="831240"/>
+            <a:ext cx="7991280" cy="830880"/>
           </a:xfrm>
           <a:prstGeom prst="rect">
             <a:avLst/>
@@ -4730,7 +4676,7 @@
       </p:sp>
       <p:pic>
         <p:nvPicPr>
-          <p:cNvPr id="84" name="Picture 7" descr=""/>
+          <p:cNvPr id="82" name="Picture 7" descr=""/>
           <p:cNvPicPr/>
           <p:nvPr/>
         </p:nvPicPr>
@@ -4741,7 +4687,7 @@
         <p:spPr>
           <a:xfrm>
             <a:off x="8310960" y="2160"/>
-            <a:ext cx="832320" cy="832320"/>
+            <a:ext cx="831960" cy="831960"/>
           </a:xfrm>
           <a:prstGeom prst="rect">
             <a:avLst/>
@@ -4753,14 +4699,14 @@
       </p:pic>
       <p:sp>
         <p:nvSpPr>
-          <p:cNvPr id="85" name="CustomShape 3"/>
+          <p:cNvPr id="83" name="CustomShape 3"/>
           <p:cNvSpPr/>
           <p:nvPr/>
         </p:nvSpPr>
         <p:spPr>
           <a:xfrm>
             <a:off x="1202040" y="188640"/>
-            <a:ext cx="6982560" cy="455760"/>
+            <a:ext cx="6982200" cy="455400"/>
           </a:xfrm>
           <a:prstGeom prst="rect">
             <a:avLst/>
@@ -4800,14 +4746,14 @@
       </p:sp>
       <p:sp>
         <p:nvSpPr>
-          <p:cNvPr id="86" name="CustomShape 4"/>
+          <p:cNvPr id="84" name="CustomShape 4"/>
           <p:cNvSpPr/>
           <p:nvPr/>
         </p:nvSpPr>
         <p:spPr>
           <a:xfrm>
             <a:off x="457200" y="1188720"/>
-            <a:ext cx="8412120" cy="4865760"/>
+            <a:ext cx="8411760" cy="4865400"/>
           </a:xfrm>
           <a:prstGeom prst="rect">
             <a:avLst/>
@@ -4836,7 +4782,11 @@
             </a:pPr>
             <a:r>
               <a:rPr i="1" lang="en-US" strike="noStrike">
-                <a:latin typeface="DejaVu Sans"/>
+                <a:solidFill>
+                  <a:srgbClr val="000000"/>
+                </a:solidFill>
+                <a:latin typeface="DejaVu Sans"/>
+                <a:ea typeface="DejaVu Sans"/>
               </a:rPr>
               <a:t>Major Design Choices:</a:t>
             </a:r>
@@ -4853,7 +4803,11 @@
             </a:pPr>
             <a:r>
               <a:rPr lang="en-US" strike="noStrike">
-                <a:latin typeface="DejaVu Sans"/>
+                <a:solidFill>
+                  <a:srgbClr val="000000"/>
+                </a:solidFill>
+                <a:latin typeface="DejaVu Sans"/>
+                <a:ea typeface="DejaVu Sans"/>
               </a:rPr>
               <a:t>Custom vs Off-The-Shelf SLAM Package</a:t>
             </a:r>
@@ -4870,7 +4824,11 @@
             </a:pPr>
             <a:r>
               <a:rPr lang="en-US" strike="noStrike">
-                <a:latin typeface="DejaVu Sans"/>
+                <a:solidFill>
+                  <a:srgbClr val="000000"/>
+                </a:solidFill>
+                <a:latin typeface="DejaVu Sans"/>
+                <a:ea typeface="DejaVu Sans"/>
               </a:rPr>
               <a:t>Underlying algorithmic options</a:t>
             </a:r>
@@ -4887,7 +4845,11 @@
             </a:pPr>
             <a:r>
               <a:rPr lang="en-US" strike="noStrike">
-                <a:latin typeface="DejaVu Sans"/>
+                <a:solidFill>
+                  <a:srgbClr val="000000"/>
+                </a:solidFill>
+                <a:latin typeface="DejaVu Sans"/>
+                <a:ea typeface="DejaVu Sans"/>
               </a:rPr>
               <a:t>Sparse vs Dense</a:t>
             </a:r>
@@ -4904,7 +4866,11 @@
             </a:pPr>
             <a:r>
               <a:rPr lang="en-US" strike="noStrike">
-                <a:latin typeface="DejaVu Sans"/>
+                <a:solidFill>
+                  <a:srgbClr val="000000"/>
+                </a:solidFill>
+                <a:latin typeface="DejaVu Sans"/>
+                <a:ea typeface="DejaVu Sans"/>
               </a:rPr>
               <a:t>Loop closure support</a:t>
             </a:r>
@@ -4921,7 +4887,11 @@
             </a:pPr>
             <a:r>
               <a:rPr lang="en-US" strike="noStrike">
-                <a:latin typeface="DejaVu Sans"/>
+                <a:solidFill>
+                  <a:srgbClr val="000000"/>
+                </a:solidFill>
+                <a:latin typeface="DejaVu Sans"/>
+                <a:ea typeface="DejaVu Sans"/>
               </a:rPr>
               <a:t>Image processing choices:</a:t>
             </a:r>
@@ -4938,7 +4908,11 @@
             </a:pPr>
             <a:r>
               <a:rPr lang="en-US" strike="noStrike">
-                <a:latin typeface="DejaVu Sans"/>
+                <a:solidFill>
+                  <a:srgbClr val="000000"/>
+                </a:solidFill>
+                <a:latin typeface="DejaVu Sans"/>
+                <a:ea typeface="DejaVu Sans"/>
               </a:rPr>
               <a:t>Onboard</a:t>
             </a:r>
@@ -4955,7 +4929,11 @@
             </a:pPr>
             <a:r>
               <a:rPr lang="en-US" strike="noStrike">
-                <a:latin typeface="DejaVu Sans"/>
+                <a:solidFill>
+                  <a:srgbClr val="000000"/>
+                </a:solidFill>
+                <a:latin typeface="DejaVu Sans"/>
+                <a:ea typeface="DejaVu Sans"/>
               </a:rPr>
               <a:t>Auxiliary processor</a:t>
             </a:r>
@@ -4972,7 +4950,11 @@
             </a:pPr>
             <a:r>
               <a:rPr lang="en-US" strike="noStrike">
-                <a:latin typeface="DejaVu Sans"/>
+                <a:solidFill>
+                  <a:srgbClr val="000000"/>
+                </a:solidFill>
+                <a:latin typeface="DejaVu Sans"/>
+                <a:ea typeface="DejaVu Sans"/>
               </a:rPr>
               <a:t>Image sensor choices: </a:t>
             </a:r>
@@ -4989,7 +4971,11 @@
             </a:pPr>
             <a:r>
               <a:rPr lang="en-US" strike="noStrike">
-                <a:latin typeface="DejaVu Sans"/>
+                <a:solidFill>
+                  <a:srgbClr val="000000"/>
+                </a:solidFill>
+                <a:latin typeface="DejaVu Sans"/>
+                <a:ea typeface="DejaVu Sans"/>
               </a:rPr>
               <a:t>Monocular</a:t>
             </a:r>
@@ -5006,7 +4992,11 @@
             </a:pPr>
             <a:r>
               <a:rPr lang="en-US" strike="noStrike">
-                <a:latin typeface="DejaVu Sans"/>
+                <a:solidFill>
+                  <a:srgbClr val="000000"/>
+                </a:solidFill>
+                <a:latin typeface="DejaVu Sans"/>
+                <a:ea typeface="DejaVu Sans"/>
               </a:rPr>
               <a:t>Visual + Depth</a:t>
             </a:r>
@@ -5023,7 +5013,11 @@
             </a:pPr>
             <a:r>
               <a:rPr lang="en-US" strike="noStrike">
-                <a:latin typeface="DejaVu Sans"/>
+                <a:solidFill>
+                  <a:srgbClr val="000000"/>
+                </a:solidFill>
+                <a:latin typeface="DejaVu Sans"/>
+                <a:ea typeface="DejaVu Sans"/>
               </a:rPr>
               <a:t>Stereo pair</a:t>
             </a:r>
@@ -5040,7 +5034,11 @@
             </a:pPr>
             <a:r>
               <a:rPr lang="en-US" strike="noStrike">
-                <a:latin typeface="DejaVu Sans"/>
+                <a:solidFill>
+                  <a:srgbClr val="000000"/>
+                </a:solidFill>
+                <a:latin typeface="DejaVu Sans"/>
+                <a:ea typeface="DejaVu Sans"/>
               </a:rPr>
               <a:t>Additional sensor options</a:t>
             </a:r>
@@ -5057,7 +5055,11 @@
             </a:pPr>
             <a:r>
               <a:rPr lang="en-US" strike="noStrike">
-                <a:latin typeface="DejaVu Sans"/>
+                <a:solidFill>
+                  <a:srgbClr val="000000"/>
+                </a:solidFill>
+                <a:latin typeface="DejaVu Sans"/>
+                <a:ea typeface="DejaVu Sans"/>
               </a:rPr>
               <a:t>Ultrasound</a:t>
             </a:r>
@@ -5074,7 +5076,11 @@
             </a:pPr>
             <a:r>
               <a:rPr lang="en-US" strike="noStrike">
-                <a:latin typeface="DejaVu Sans"/>
+                <a:solidFill>
+                  <a:srgbClr val="000000"/>
+                </a:solidFill>
+                <a:latin typeface="DejaVu Sans"/>
+                <a:ea typeface="DejaVu Sans"/>
               </a:rPr>
               <a:t>Scanning laser</a:t>
             </a:r>
@@ -5091,7 +5097,11 @@
             </a:pPr>
             <a:r>
               <a:rPr lang="en-US" strike="noStrike">
-                <a:latin typeface="DejaVu Sans"/>
+                <a:solidFill>
+                  <a:srgbClr val="000000"/>
+                </a:solidFill>
+                <a:latin typeface="DejaVu Sans"/>
+                <a:ea typeface="DejaVu Sans"/>
               </a:rPr>
               <a:t>Laser altimeter</a:t>
             </a:r>
@@ -5113,7 +5123,11 @@
             </a:pPr>
             <a:r>
               <a:rPr lang="en-US" strike="noStrike">
-                <a:latin typeface="DejaVu Sans"/>
+                <a:solidFill>
+                  <a:srgbClr val="000000"/>
+                </a:solidFill>
+                <a:latin typeface="DejaVu Sans"/>
+                <a:ea typeface="DejaVu Sans"/>
               </a:rPr>
               <a:t>	</a:t>
             </a:r>
@@ -5172,7 +5186,7 @@
       </p:grpSpPr>
       <p:sp>
         <p:nvSpPr>
-          <p:cNvPr id="87" name="Line 1"/>
+          <p:cNvPr id="85" name="Line 1"/>
           <p:cNvSpPr/>
           <p:nvPr/>
         </p:nvSpPr>
@@ -5193,7 +5207,7 @@
       </p:sp>
       <p:pic>
         <p:nvPicPr>
-          <p:cNvPr id="88" name="Picture 5" descr=""/>
+          <p:cNvPr id="86" name="Picture 5" descr=""/>
           <p:cNvPicPr/>
           <p:nvPr/>
         </p:nvPicPr>
@@ -5204,7 +5218,7 @@
         <p:spPr>
           <a:xfrm>
             <a:off x="0" y="0"/>
-            <a:ext cx="1150920" cy="843120"/>
+            <a:ext cx="1150560" cy="842760"/>
           </a:xfrm>
           <a:prstGeom prst="rect">
             <a:avLst/>
@@ -5216,14 +5230,14 @@
       </p:pic>
       <p:sp>
         <p:nvSpPr>
-          <p:cNvPr id="89" name="CustomShape 2"/>
+          <p:cNvPr id="87" name="CustomShape 2"/>
           <p:cNvSpPr/>
           <p:nvPr/>
         </p:nvSpPr>
         <p:spPr>
           <a:xfrm>
             <a:off x="1151640" y="2160"/>
-            <a:ext cx="7991640" cy="831240"/>
+            <a:ext cx="7991280" cy="830880"/>
           </a:xfrm>
           <a:prstGeom prst="rect">
             <a:avLst/>
@@ -5260,7 +5274,7 @@
       </p:sp>
       <p:pic>
         <p:nvPicPr>
-          <p:cNvPr id="90" name="Picture 7" descr=""/>
+          <p:cNvPr id="88" name="Picture 7" descr=""/>
           <p:cNvPicPr/>
           <p:nvPr/>
         </p:nvPicPr>
@@ -5271,7 +5285,7 @@
         <p:spPr>
           <a:xfrm>
             <a:off x="8310960" y="2160"/>
-            <a:ext cx="832320" cy="832320"/>
+            <a:ext cx="831960" cy="831960"/>
           </a:xfrm>
           <a:prstGeom prst="rect">
             <a:avLst/>
@@ -5283,14 +5297,14 @@
       </p:pic>
       <p:sp>
         <p:nvSpPr>
-          <p:cNvPr id="91" name="CustomShape 3"/>
+          <p:cNvPr id="89" name="CustomShape 3"/>
           <p:cNvSpPr/>
           <p:nvPr/>
         </p:nvSpPr>
         <p:spPr>
           <a:xfrm>
             <a:off x="1202040" y="188640"/>
-            <a:ext cx="6982560" cy="455760"/>
+            <a:ext cx="6982200" cy="455400"/>
           </a:xfrm>
           <a:prstGeom prst="rect">
             <a:avLst/>
@@ -5330,14 +5344,14 @@
       </p:sp>
       <p:sp>
         <p:nvSpPr>
-          <p:cNvPr id="92" name="CustomShape 4"/>
+          <p:cNvPr id="90" name="CustomShape 4"/>
           <p:cNvSpPr/>
           <p:nvPr/>
         </p:nvSpPr>
         <p:spPr>
           <a:xfrm>
             <a:off x="548640" y="1188720"/>
-            <a:ext cx="8229240" cy="5927040"/>
+            <a:ext cx="8228880" cy="5926680"/>
           </a:xfrm>
           <a:prstGeom prst="rect">
             <a:avLst/>
@@ -5358,7 +5372,11 @@
           <a:p>
             <a:r>
               <a:rPr lang="en-US" strike="noStrike">
-                <a:latin typeface="DejaVu Sans"/>
+                <a:solidFill>
+                  <a:srgbClr val="000000"/>
+                </a:solidFill>
+                <a:latin typeface="DejaVu Sans"/>
+                <a:ea typeface="DejaVu Sans"/>
               </a:rPr>
               <a:t>Given timeline and team resources, development of a custom SLAM solution was not feasible</a:t>
             </a:r>
@@ -5370,7 +5388,11 @@
           <a:p>
             <a:r>
               <a:rPr lang="en-US" strike="noStrike">
-                <a:latin typeface="DejaVu Sans"/>
+                <a:solidFill>
+                  <a:srgbClr val="000000"/>
+                </a:solidFill>
+                <a:latin typeface="DejaVu Sans"/>
+                <a:ea typeface="DejaVu Sans"/>
               </a:rPr>
               <a:t>Turned to available software packages for their support of popular varieties of SLAM:</a:t>
             </a:r>
@@ -5379,7 +5401,11 @@
           <a:p>
             <a:r>
               <a:rPr lang="en-US" strike="noStrike">
-                <a:latin typeface="DejaVu Sans"/>
+                <a:solidFill>
+                  <a:srgbClr val="000000"/>
+                </a:solidFill>
+                <a:latin typeface="DejaVu Sans"/>
+                <a:ea typeface="DejaVu Sans"/>
               </a:rPr>
               <a:t>	</a:t>
             </a:r>
@@ -5388,13 +5414,21 @@
           <a:p>
             <a:r>
               <a:rPr lang="en-US" strike="noStrike">
-                <a:latin typeface="DejaVu Sans"/>
+                <a:solidFill>
+                  <a:srgbClr val="000000"/>
+                </a:solidFill>
+                <a:latin typeface="DejaVu Sans"/>
+                <a:ea typeface="DejaVu Sans"/>
               </a:rPr>
               <a:t>	</a:t>
             </a:r>
             <a:r>
               <a:rPr i="1" lang="en-US" strike="noStrike">
-                <a:latin typeface="DejaVu Sans"/>
+                <a:solidFill>
+                  <a:srgbClr val="000000"/>
+                </a:solidFill>
+                <a:latin typeface="DejaVu Sans"/>
+                <a:ea typeface="DejaVu Sans"/>
               </a:rPr>
               <a:t>RGBDSlam</a:t>
             </a:r>
@@ -5403,13 +5437,21 @@
           <a:p>
             <a:r>
               <a:rPr i="1" lang="en-US" strike="noStrike">
-                <a:latin typeface="DejaVu Sans"/>
+                <a:solidFill>
+                  <a:srgbClr val="000000"/>
+                </a:solidFill>
+                <a:latin typeface="DejaVu Sans"/>
+                <a:ea typeface="DejaVu Sans"/>
               </a:rPr>
               <a:t>	</a:t>
             </a:r>
             <a:r>
               <a:rPr i="1" lang="en-US" strike="noStrike">
-                <a:latin typeface="DejaVu Sans"/>
+                <a:solidFill>
+                  <a:srgbClr val="000000"/>
+                </a:solidFill>
+                <a:latin typeface="DejaVu Sans"/>
+                <a:ea typeface="DejaVu Sans"/>
               </a:rPr>
               <a:t>RTABMap</a:t>
             </a:r>
@@ -5418,13 +5460,21 @@
           <a:p>
             <a:r>
               <a:rPr i="1" lang="en-US" strike="noStrike">
-                <a:latin typeface="DejaVu Sans"/>
+                <a:solidFill>
+                  <a:srgbClr val="000000"/>
+                </a:solidFill>
+                <a:latin typeface="DejaVu Sans"/>
+                <a:ea typeface="DejaVu Sans"/>
               </a:rPr>
               <a:t>	</a:t>
             </a:r>
             <a:r>
               <a:rPr i="1" lang="en-US" strike="noStrike">
-                <a:latin typeface="DejaVu Sans"/>
+                <a:solidFill>
+                  <a:srgbClr val="000000"/>
+                </a:solidFill>
+                <a:latin typeface="DejaVu Sans"/>
+                <a:ea typeface="DejaVu Sans"/>
               </a:rPr>
               <a:t>CCNYSlam</a:t>
             </a:r>
@@ -5433,13 +5483,21 @@
           <a:p>
             <a:r>
               <a:rPr i="1" lang="en-US" strike="noStrike">
-                <a:latin typeface="DejaVu Sans"/>
+                <a:solidFill>
+                  <a:srgbClr val="000000"/>
+                </a:solidFill>
+                <a:latin typeface="DejaVu Sans"/>
+                <a:ea typeface="DejaVu Sans"/>
               </a:rPr>
               <a:t>	</a:t>
             </a:r>
             <a:r>
               <a:rPr i="1" lang="en-US" strike="noStrike">
-                <a:latin typeface="DejaVu Sans"/>
+                <a:solidFill>
+                  <a:srgbClr val="000000"/>
+                </a:solidFill>
+                <a:latin typeface="DejaVu Sans"/>
+                <a:ea typeface="DejaVu Sans"/>
               </a:rPr>
               <a:t>LSDSlam</a:t>
             </a:r>
@@ -5451,7 +5509,11 @@
           <a:p>
             <a:r>
               <a:rPr lang="en-US" strike="noStrike">
-                <a:latin typeface="DejaVu Sans"/>
+                <a:solidFill>
+                  <a:srgbClr val="000000"/>
+                </a:solidFill>
+                <a:latin typeface="DejaVu Sans"/>
+                <a:ea typeface="DejaVu Sans"/>
               </a:rPr>
               <a:t>Package determines sensors required and potential limitations</a:t>
             </a:r>
@@ -5463,7 +5525,11 @@
           <a:p>
             <a:r>
               <a:rPr lang="en-US" strike="noStrike">
-                <a:latin typeface="DejaVu Sans"/>
+                <a:solidFill>
+                  <a:srgbClr val="000000"/>
+                </a:solidFill>
+                <a:latin typeface="DejaVu Sans"/>
+                <a:ea typeface="DejaVu Sans"/>
               </a:rPr>
               <a:t>Loop closure determined to be a necessary feature to support operations in larger spaces</a:t>
             </a:r>
@@ -5475,7 +5541,11 @@
           <a:p>
             <a:r>
               <a:rPr lang="en-US" strike="noStrike">
-                <a:latin typeface="DejaVu Sans"/>
+                <a:solidFill>
+                  <a:srgbClr val="000000"/>
+                </a:solidFill>
+                <a:latin typeface="DejaVu Sans"/>
+                <a:ea typeface="DejaVu Sans"/>
               </a:rPr>
               <a:t>Necessary to have immediate position output for use in control system</a:t>
             </a:r>
@@ -5487,7 +5557,11 @@
           <a:p>
             <a:r>
               <a:rPr lang="en-US" strike="noStrike">
-                <a:latin typeface="DejaVu Sans"/>
+                <a:solidFill>
+                  <a:srgbClr val="000000"/>
+                </a:solidFill>
+                <a:latin typeface="DejaVu Sans"/>
+                <a:ea typeface="DejaVu Sans"/>
               </a:rPr>
               <a:t>Required to provide reasonable performance on a CPU that can be flown as payload</a:t>
             </a:r>
@@ -5496,7 +5570,11 @@
           <a:p>
             <a:r>
               <a:rPr lang="en-US" strike="noStrike">
-                <a:latin typeface="DejaVu Sans"/>
+                <a:solidFill>
+                  <a:srgbClr val="000000"/>
+                </a:solidFill>
+                <a:latin typeface="DejaVu Sans"/>
+                <a:ea typeface="DejaVu Sans"/>
               </a:rPr>
               <a:t>	</a:t>
             </a:r>
@@ -5555,7 +5633,7 @@
       </p:grpSpPr>
       <p:sp>
         <p:nvSpPr>
-          <p:cNvPr id="93" name="Line 1"/>
+          <p:cNvPr id="91" name="Line 1"/>
           <p:cNvSpPr/>
           <p:nvPr/>
         </p:nvSpPr>
@@ -5576,7 +5654,7 @@
       </p:sp>
       <p:pic>
         <p:nvPicPr>
-          <p:cNvPr id="94" name="Picture 5" descr=""/>
+          <p:cNvPr id="92" name="Picture 5" descr=""/>
           <p:cNvPicPr/>
           <p:nvPr/>
         </p:nvPicPr>
@@ -5587,7 +5665,7 @@
         <p:spPr>
           <a:xfrm>
             <a:off x="0" y="0"/>
-            <a:ext cx="1150920" cy="843120"/>
+            <a:ext cx="1150560" cy="842760"/>
           </a:xfrm>
           <a:prstGeom prst="rect">
             <a:avLst/>
@@ -5599,14 +5677,14 @@
       </p:pic>
       <p:sp>
         <p:nvSpPr>
-          <p:cNvPr id="95" name="CustomShape 2"/>
+          <p:cNvPr id="93" name="CustomShape 2"/>
           <p:cNvSpPr/>
           <p:nvPr/>
         </p:nvSpPr>
         <p:spPr>
           <a:xfrm>
             <a:off x="1151640" y="2160"/>
-            <a:ext cx="7991640" cy="831240"/>
+            <a:ext cx="7991280" cy="830880"/>
           </a:xfrm>
           <a:prstGeom prst="rect">
             <a:avLst/>
@@ -5643,7 +5721,7 @@
       </p:sp>
       <p:pic>
         <p:nvPicPr>
-          <p:cNvPr id="96" name="Picture 7" descr=""/>
+          <p:cNvPr id="94" name="Picture 7" descr=""/>
           <p:cNvPicPr/>
           <p:nvPr/>
         </p:nvPicPr>
@@ -5654,7 +5732,7 @@
         <p:spPr>
           <a:xfrm>
             <a:off x="8310960" y="2160"/>
-            <a:ext cx="832320" cy="832320"/>
+            <a:ext cx="831960" cy="831960"/>
           </a:xfrm>
           <a:prstGeom prst="rect">
             <a:avLst/>
@@ -5666,14 +5744,14 @@
       </p:pic>
       <p:sp>
         <p:nvSpPr>
-          <p:cNvPr id="97" name="CustomShape 3"/>
+          <p:cNvPr id="95" name="CustomShape 3"/>
           <p:cNvSpPr/>
           <p:nvPr/>
         </p:nvSpPr>
         <p:spPr>
           <a:xfrm>
             <a:off x="1202040" y="188640"/>
-            <a:ext cx="6982560" cy="455760"/>
+            <a:ext cx="6982200" cy="455400"/>
           </a:xfrm>
           <a:prstGeom prst="rect">
             <a:avLst/>
@@ -5713,14 +5791,14 @@
       </p:sp>
       <p:sp>
         <p:nvSpPr>
-          <p:cNvPr id="98" name="CustomShape 4"/>
+          <p:cNvPr id="96" name="CustomShape 4"/>
           <p:cNvSpPr/>
           <p:nvPr/>
         </p:nvSpPr>
         <p:spPr>
           <a:xfrm>
             <a:off x="548640" y="1188720"/>
-            <a:ext cx="8229240" cy="2743200"/>
+            <a:ext cx="8228880" cy="2742840"/>
           </a:xfrm>
           <a:prstGeom prst="rect">
             <a:avLst/>
@@ -5741,13 +5819,21 @@
           <a:p>
             <a:r>
               <a:rPr b="1" lang="en-US" strike="noStrike">
-                <a:latin typeface="DejaVu Sans"/>
+                <a:solidFill>
+                  <a:srgbClr val="000000"/>
+                </a:solidFill>
+                <a:latin typeface="DejaVu Sans"/>
+                <a:ea typeface="DejaVu Sans"/>
               </a:rPr>
               <a:t>Design choice: </a:t>
             </a:r>
             <a:r>
               <a:rPr b="1" i="1" lang="en-US" strike="noStrike">
-                <a:latin typeface="DejaVu Sans"/>
+                <a:solidFill>
+                  <a:srgbClr val="000000"/>
+                </a:solidFill>
+                <a:latin typeface="DejaVu Sans"/>
+                <a:ea typeface="DejaVu Sans"/>
               </a:rPr>
               <a:t>RTABMap</a:t>
             </a:r>
@@ -5756,7 +5842,11 @@
           <a:p>
             <a:r>
               <a:rPr lang="en-US" strike="noStrike">
-                <a:latin typeface="DejaVu Sans"/>
+                <a:solidFill>
+                  <a:srgbClr val="000000"/>
+                </a:solidFill>
+                <a:latin typeface="DejaVu Sans"/>
+                <a:ea typeface="DejaVu Sans"/>
               </a:rPr>
               <a:t>	</a:t>
             </a:r>
@@ -5765,13 +5855,21 @@
           <a:p>
             <a:r>
               <a:rPr lang="en-US" strike="noStrike">
-                <a:latin typeface="DejaVu Sans"/>
+                <a:solidFill>
+                  <a:srgbClr val="000000"/>
+                </a:solidFill>
+                <a:latin typeface="DejaVu Sans"/>
+                <a:ea typeface="DejaVu Sans"/>
               </a:rPr>
               <a:t>	</a:t>
             </a:r>
             <a:r>
               <a:rPr lang="en-US" strike="noStrike">
-                <a:latin typeface="DejaVu Sans"/>
+                <a:solidFill>
+                  <a:srgbClr val="000000"/>
+                </a:solidFill>
+                <a:latin typeface="DejaVu Sans"/>
+                <a:ea typeface="DejaVu Sans"/>
               </a:rPr>
               <a:t>Demonstrated capability aboard ARM SOCs</a:t>
             </a:r>
@@ -5780,13 +5878,21 @@
           <a:p>
             <a:r>
               <a:rPr lang="en-US" strike="noStrike">
-                <a:latin typeface="DejaVu Sans"/>
+                <a:solidFill>
+                  <a:srgbClr val="000000"/>
+                </a:solidFill>
+                <a:latin typeface="DejaVu Sans"/>
+                <a:ea typeface="DejaVu Sans"/>
               </a:rPr>
               <a:t>	</a:t>
             </a:r>
             <a:r>
               <a:rPr lang="en-US" strike="noStrike">
-                <a:latin typeface="DejaVu Sans"/>
+                <a:solidFill>
+                  <a:srgbClr val="000000"/>
+                </a:solidFill>
+                <a:latin typeface="DejaVu Sans"/>
+                <a:ea typeface="DejaVu Sans"/>
               </a:rPr>
               <a:t>Provides for loop closure and map generation</a:t>
             </a:r>
@@ -5795,13 +5901,21 @@
           <a:p>
             <a:r>
               <a:rPr lang="en-US" strike="noStrike">
-                <a:latin typeface="DejaVu Sans"/>
+                <a:solidFill>
+                  <a:srgbClr val="000000"/>
+                </a:solidFill>
+                <a:latin typeface="DejaVu Sans"/>
+                <a:ea typeface="DejaVu Sans"/>
               </a:rPr>
               <a:t>	</a:t>
             </a:r>
             <a:r>
               <a:rPr lang="en-US" strike="noStrike">
-                <a:latin typeface="DejaVu Sans"/>
+                <a:solidFill>
+                  <a:srgbClr val="000000"/>
+                </a:solidFill>
+                <a:latin typeface="DejaVu Sans"/>
+                <a:ea typeface="DejaVu Sans"/>
               </a:rPr>
               <a:t>Able to use a variety of sensor inputs (RGB-D / stereo / laser)</a:t>
             </a:r>
@@ -5810,13 +5924,21 @@
           <a:p>
             <a:r>
               <a:rPr lang="en-US" strike="noStrike">
-                <a:latin typeface="DejaVu Sans"/>
+                <a:solidFill>
+                  <a:srgbClr val="000000"/>
+                </a:solidFill>
+                <a:latin typeface="DejaVu Sans"/>
+                <a:ea typeface="DejaVu Sans"/>
               </a:rPr>
               <a:t>	</a:t>
             </a:r>
             <a:r>
               <a:rPr lang="en-US" strike="noStrike">
-                <a:latin typeface="DejaVu Sans"/>
+                <a:solidFill>
+                  <a:srgbClr val="000000"/>
+                </a:solidFill>
+                <a:latin typeface="DejaVu Sans"/>
+                <a:ea typeface="DejaVu Sans"/>
               </a:rPr>
               <a:t>Uses sparse methods with a keyframe approach to minimize growth of map over large areas</a:t>
             </a:r>
@@ -5828,7 +5950,11 @@
           <a:p>
             <a:r>
               <a:rPr lang="en-US" strike="noStrike">
-                <a:latin typeface="DejaVu Sans"/>
+                <a:solidFill>
+                  <a:srgbClr val="000000"/>
+                </a:solidFill>
+                <a:latin typeface="DejaVu Sans"/>
+                <a:ea typeface="DejaVu Sans"/>
               </a:rPr>
               <a:t>	</a:t>
             </a:r>
@@ -5837,7 +5963,11 @@
           <a:p>
             <a:r>
               <a:rPr lang="en-US" strike="noStrike">
-                <a:latin typeface="DejaVu Sans"/>
+                <a:solidFill>
+                  <a:srgbClr val="000000"/>
+                </a:solidFill>
+                <a:latin typeface="DejaVu Sans"/>
+                <a:ea typeface="DejaVu Sans"/>
               </a:rPr>
               <a:t>	</a:t>
             </a:r>
@@ -5896,7 +6026,7 @@
       </p:grpSpPr>
       <p:sp>
         <p:nvSpPr>
-          <p:cNvPr id="99" name="Line 1"/>
+          <p:cNvPr id="97" name="Line 1"/>
           <p:cNvSpPr/>
           <p:nvPr/>
         </p:nvSpPr>
@@ -5917,7 +6047,7 @@
       </p:sp>
       <p:pic>
         <p:nvPicPr>
-          <p:cNvPr id="100" name="Picture 5" descr=""/>
+          <p:cNvPr id="98" name="Picture 5" descr=""/>
           <p:cNvPicPr/>
           <p:nvPr/>
         </p:nvPicPr>
@@ -5928,7 +6058,7 @@
         <p:spPr>
           <a:xfrm>
             <a:off x="0" y="0"/>
-            <a:ext cx="1150920" cy="843120"/>
+            <a:ext cx="1150560" cy="842760"/>
           </a:xfrm>
           <a:prstGeom prst="rect">
             <a:avLst/>
@@ -5940,14 +6070,14 @@
       </p:pic>
       <p:sp>
         <p:nvSpPr>
-          <p:cNvPr id="101" name="CustomShape 2"/>
+          <p:cNvPr id="99" name="CustomShape 2"/>
           <p:cNvSpPr/>
           <p:nvPr/>
         </p:nvSpPr>
         <p:spPr>
           <a:xfrm>
             <a:off x="1151640" y="2160"/>
-            <a:ext cx="7991640" cy="831240"/>
+            <a:ext cx="7991280" cy="830880"/>
           </a:xfrm>
           <a:prstGeom prst="rect">
             <a:avLst/>
@@ -5984,7 +6114,7 @@
       </p:sp>
       <p:pic>
         <p:nvPicPr>
-          <p:cNvPr id="102" name="Picture 7" descr=""/>
+          <p:cNvPr id="100" name="Picture 7" descr=""/>
           <p:cNvPicPr/>
           <p:nvPr/>
         </p:nvPicPr>
@@ -5995,7 +6125,7 @@
         <p:spPr>
           <a:xfrm>
             <a:off x="8310960" y="2160"/>
-            <a:ext cx="832320" cy="832320"/>
+            <a:ext cx="831960" cy="831960"/>
           </a:xfrm>
           <a:prstGeom prst="rect">
             <a:avLst/>
@@ -6007,14 +6137,14 @@
       </p:pic>
       <p:sp>
         <p:nvSpPr>
-          <p:cNvPr id="103" name="CustomShape 3"/>
+          <p:cNvPr id="101" name="CustomShape 3"/>
           <p:cNvSpPr/>
           <p:nvPr/>
         </p:nvSpPr>
         <p:spPr>
           <a:xfrm>
             <a:off x="1202040" y="188640"/>
-            <a:ext cx="6982560" cy="455760"/>
+            <a:ext cx="6982200" cy="455400"/>
           </a:xfrm>
           <a:prstGeom prst="rect">
             <a:avLst/>
@@ -6054,14 +6184,14 @@
       </p:sp>
       <p:sp>
         <p:nvSpPr>
-          <p:cNvPr id="104" name="CustomShape 4"/>
+          <p:cNvPr id="102" name="CustomShape 4"/>
           <p:cNvSpPr/>
           <p:nvPr/>
         </p:nvSpPr>
         <p:spPr>
           <a:xfrm>
             <a:off x="548640" y="1188720"/>
-            <a:ext cx="8229240" cy="1947240"/>
+            <a:ext cx="8228880" cy="1946880"/>
           </a:xfrm>
           <a:prstGeom prst="rect">
             <a:avLst/>
@@ -6082,13 +6212,21 @@
           <a:p>
             <a:r>
               <a:rPr i="1" lang="en-US" strike="noStrike">
-                <a:latin typeface="DejaVu Sans"/>
+                <a:solidFill>
+                  <a:srgbClr val="000000"/>
+                </a:solidFill>
+                <a:latin typeface="DejaVu Sans"/>
+                <a:ea typeface="DejaVu Sans"/>
               </a:rPr>
               <a:t>RTABMap</a:t>
             </a:r>
             <a:r>
               <a:rPr lang="en-US" strike="noStrike">
-                <a:latin typeface="DejaVu Sans"/>
+                <a:solidFill>
+                  <a:srgbClr val="000000"/>
+                </a:solidFill>
+                <a:latin typeface="DejaVu Sans"/>
+                <a:ea typeface="DejaVu Sans"/>
               </a:rPr>
               <a:t> requires an odometry source of some sort</a:t>
             </a:r>
@@ -6105,7 +6243,11 @@
             </a:pPr>
             <a:r>
               <a:rPr lang="en-US" strike="noStrike">
-                <a:latin typeface="DejaVu Sans"/>
+                <a:solidFill>
+                  <a:srgbClr val="000000"/>
+                </a:solidFill>
+                <a:latin typeface="DejaVu Sans"/>
+                <a:ea typeface="DejaVu Sans"/>
               </a:rPr>
               <a:t>External odometry could offload a major source of CPU utilization</a:t>
             </a:r>
@@ -6122,7 +6264,11 @@
             </a:pPr>
             <a:r>
               <a:rPr lang="en-US" strike="noStrike">
-                <a:latin typeface="DejaVu Sans"/>
+                <a:solidFill>
+                  <a:srgbClr val="000000"/>
+                </a:solidFill>
+                <a:latin typeface="DejaVu Sans"/>
+                <a:ea typeface="DejaVu Sans"/>
               </a:rPr>
               <a:t>Capable of generating odometry from monocular or stereo sensors</a:t>
             </a:r>
@@ -6144,7 +6290,11 @@
             </a:pPr>
             <a:r>
               <a:rPr lang="en-US" strike="noStrike">
-                <a:latin typeface="DejaVu Sans"/>
+                <a:solidFill>
+                  <a:srgbClr val="000000"/>
+                </a:solidFill>
+                <a:latin typeface="DejaVu Sans"/>
+                <a:ea typeface="DejaVu Sans"/>
               </a:rPr>
               <a:t>	</a:t>
             </a:r>
@@ -6158,7 +6308,11 @@
             </a:pPr>
             <a:r>
               <a:rPr lang="en-US" strike="noStrike">
-                <a:latin typeface="DejaVu Sans"/>
+                <a:solidFill>
+                  <a:srgbClr val="000000"/>
+                </a:solidFill>
+                <a:latin typeface="DejaVu Sans"/>
+                <a:ea typeface="DejaVu Sans"/>
               </a:rPr>
               <a:t>	</a:t>
             </a:r>
@@ -6168,14 +6322,14 @@
       </p:sp>
       <p:sp>
         <p:nvSpPr>
-          <p:cNvPr id="105" name="CustomShape 5"/>
+          <p:cNvPr id="103" name="CustomShape 5"/>
           <p:cNvSpPr/>
           <p:nvPr/>
         </p:nvSpPr>
         <p:spPr>
           <a:xfrm>
             <a:off x="640080" y="2440440"/>
-            <a:ext cx="3840120" cy="3008520"/>
+            <a:ext cx="3839760" cy="3008160"/>
           </a:xfrm>
           <a:prstGeom prst="rect">
             <a:avLst/>
@@ -6196,19 +6350,31 @@
           <a:p>
             <a:r>
               <a:rPr b="1" lang="en-US" strike="noStrike">
-                <a:latin typeface="DejaVu Sans"/>
+                <a:solidFill>
+                  <a:srgbClr val="000000"/>
+                </a:solidFill>
+                <a:latin typeface="DejaVu Sans"/>
+                <a:ea typeface="DejaVu Sans"/>
               </a:rPr>
               <a:t>Design Choice:</a:t>
             </a:r>
             <a:r>
               <a:rPr lang="en-US" strike="noStrike">
-                <a:latin typeface="DejaVu Sans"/>
+                <a:solidFill>
+                  <a:srgbClr val="000000"/>
+                </a:solidFill>
+                <a:latin typeface="DejaVu Sans"/>
+                <a:ea typeface="DejaVu Sans"/>
               </a:rPr>
               <a:t> </a:t>
             </a:r>
             <a:r>
               <a:rPr i="1" lang="en-US" strike="noStrike">
-                <a:latin typeface="DejaVu Sans"/>
+                <a:solidFill>
+                  <a:srgbClr val="000000"/>
+                </a:solidFill>
+                <a:latin typeface="DejaVu Sans"/>
+                <a:ea typeface="DejaVu Sans"/>
               </a:rPr>
               <a:t>Guidance</a:t>
             </a:r>
@@ -6228,7 +6394,11 @@
             </a:pPr>
             <a:r>
               <a:rPr lang="en-US" strike="noStrike">
-                <a:latin typeface="DejaVu Sans"/>
+                <a:solidFill>
+                  <a:srgbClr val="000000"/>
+                </a:solidFill>
+                <a:latin typeface="DejaVu Sans"/>
+                <a:ea typeface="DejaVu Sans"/>
               </a:rPr>
               <a:t>Provides an external auxiliary processor to compute odometry, as well as sychronized global shutter stereo pairs</a:t>
             </a:r>
@@ -6245,7 +6415,11 @@
             </a:pPr>
             <a:r>
               <a:rPr lang="en-US" strike="noStrike">
-                <a:latin typeface="DejaVu Sans"/>
+                <a:solidFill>
+                  <a:srgbClr val="000000"/>
+                </a:solidFill>
+                <a:latin typeface="DejaVu Sans"/>
+                <a:ea typeface="DejaVu Sans"/>
               </a:rPr>
               <a:t>Includes ultrasound sensors as a bonus</a:t>
             </a:r>
@@ -6262,7 +6436,11 @@
             </a:pPr>
             <a:r>
               <a:rPr lang="en-US" strike="noStrike">
-                <a:latin typeface="DejaVu Sans"/>
+                <a:solidFill>
+                  <a:srgbClr val="000000"/>
+                </a:solidFill>
+                <a:latin typeface="DejaVu Sans"/>
+                <a:ea typeface="DejaVu Sans"/>
               </a:rPr>
               <a:t>Available as a turn-key solution</a:t>
             </a:r>
@@ -6272,14 +6450,14 @@
       </p:sp>
       <p:sp>
         <p:nvSpPr>
-          <p:cNvPr id="106" name="CustomShape 6"/>
+          <p:cNvPr id="104" name="CustomShape 6"/>
           <p:cNvSpPr/>
           <p:nvPr/>
         </p:nvSpPr>
         <p:spPr>
           <a:xfrm>
             <a:off x="731520" y="5523480"/>
-            <a:ext cx="7863480" cy="1151280"/>
+            <a:ext cx="7863120" cy="1150920"/>
           </a:xfrm>
           <a:prstGeom prst="rect">
             <a:avLst/>
@@ -6300,7 +6478,11 @@
           <a:p>
             <a:r>
               <a:rPr b="1" lang="en-US" strike="noStrike">
-                <a:latin typeface="DejaVu Sans"/>
+                <a:solidFill>
+                  <a:srgbClr val="000000"/>
+                </a:solidFill>
+                <a:latin typeface="DejaVu Sans"/>
+                <a:ea typeface="DejaVu Sans"/>
               </a:rPr>
               <a:t>Other solutions considered: </a:t>
             </a:r>
@@ -6317,7 +6499,11 @@
             </a:pPr>
             <a:r>
               <a:rPr lang="en-US" strike="noStrike">
-                <a:latin typeface="DejaVu Sans"/>
+                <a:solidFill>
+                  <a:srgbClr val="000000"/>
+                </a:solidFill>
+                <a:latin typeface="DejaVu Sans"/>
+                <a:ea typeface="DejaVu Sans"/>
               </a:rPr>
               <a:t>Mounting a second CPU to handle perception</a:t>
             </a:r>
@@ -6334,7 +6520,11 @@
             </a:pPr>
             <a:r>
               <a:rPr lang="en-US" strike="noStrike">
-                <a:latin typeface="DejaVu Sans"/>
+                <a:solidFill>
+                  <a:srgbClr val="000000"/>
+                </a:solidFill>
+                <a:latin typeface="DejaVu Sans"/>
+                <a:ea typeface="DejaVu Sans"/>
               </a:rPr>
               <a:t>Required external cameras as well</a:t>
             </a:r>
@@ -6351,7 +6541,11 @@
             </a:pPr>
             <a:r>
               <a:rPr lang="en-US" strike="noStrike">
-                <a:latin typeface="DejaVu Sans"/>
+                <a:solidFill>
+                  <a:srgbClr val="000000"/>
+                </a:solidFill>
+                <a:latin typeface="DejaVu Sans"/>
+                <a:ea typeface="DejaVu Sans"/>
               </a:rPr>
               <a:t>Rejected due to SWaP impact</a:t>
             </a:r>
@@ -6361,7 +6555,7 @@
       </p:sp>
       <p:pic>
         <p:nvPicPr>
-          <p:cNvPr id="107" name="" descr=""/>
+          <p:cNvPr id="105" name="" descr=""/>
           <p:cNvPicPr/>
           <p:nvPr/>
         </p:nvPicPr>
@@ -6372,7 +6566,7 @@
         <p:spPr>
           <a:xfrm>
             <a:off x="5019480" y="2093400"/>
-            <a:ext cx="3575520" cy="3575520"/>
+            <a:ext cx="3575160" cy="3575160"/>
           </a:xfrm>
           <a:prstGeom prst="rect">
             <a:avLst/>
@@ -6433,7 +6627,7 @@
       </p:grpSpPr>
       <p:sp>
         <p:nvSpPr>
-          <p:cNvPr id="108" name="Line 1"/>
+          <p:cNvPr id="106" name="Line 1"/>
           <p:cNvSpPr/>
           <p:nvPr/>
         </p:nvSpPr>
@@ -6454,7 +6648,7 @@
       </p:sp>
       <p:pic>
         <p:nvPicPr>
-          <p:cNvPr id="109" name="Picture 5" descr=""/>
+          <p:cNvPr id="107" name="Picture 5" descr=""/>
           <p:cNvPicPr/>
           <p:nvPr/>
         </p:nvPicPr>
@@ -6465,7 +6659,7 @@
         <p:spPr>
           <a:xfrm>
             <a:off x="0" y="0"/>
-            <a:ext cx="1150920" cy="843120"/>
+            <a:ext cx="1150560" cy="842760"/>
           </a:xfrm>
           <a:prstGeom prst="rect">
             <a:avLst/>
@@ -6477,14 +6671,14 @@
       </p:pic>
       <p:sp>
         <p:nvSpPr>
-          <p:cNvPr id="110" name="CustomShape 2"/>
+          <p:cNvPr id="108" name="CustomShape 2"/>
           <p:cNvSpPr/>
           <p:nvPr/>
         </p:nvSpPr>
         <p:spPr>
           <a:xfrm>
             <a:off x="1151640" y="2160"/>
-            <a:ext cx="7991640" cy="831240"/>
+            <a:ext cx="7991280" cy="830880"/>
           </a:xfrm>
           <a:prstGeom prst="rect">
             <a:avLst/>
@@ -6521,7 +6715,7 @@
       </p:sp>
       <p:pic>
         <p:nvPicPr>
-          <p:cNvPr id="111" name="Picture 7" descr=""/>
+          <p:cNvPr id="109" name="Picture 7" descr=""/>
           <p:cNvPicPr/>
           <p:nvPr/>
         </p:nvPicPr>
@@ -6532,7 +6726,7 @@
         <p:spPr>
           <a:xfrm>
             <a:off x="8310960" y="2160"/>
-            <a:ext cx="832320" cy="832320"/>
+            <a:ext cx="831960" cy="831960"/>
           </a:xfrm>
           <a:prstGeom prst="rect">
             <a:avLst/>
@@ -6544,14 +6738,14 @@
       </p:pic>
       <p:sp>
         <p:nvSpPr>
-          <p:cNvPr id="112" name="CustomShape 3"/>
+          <p:cNvPr id="110" name="CustomShape 3"/>
           <p:cNvSpPr/>
           <p:nvPr/>
         </p:nvSpPr>
         <p:spPr>
           <a:xfrm>
             <a:off x="1202040" y="188640"/>
-            <a:ext cx="6982560" cy="455760"/>
+            <a:ext cx="6982200" cy="455400"/>
           </a:xfrm>
           <a:prstGeom prst="rect">
             <a:avLst/>
@@ -6591,14 +6785,14 @@
       </p:sp>
       <p:sp>
         <p:nvSpPr>
-          <p:cNvPr id="113" name="CustomShape 4"/>
+          <p:cNvPr id="111" name="CustomShape 4"/>
           <p:cNvSpPr/>
           <p:nvPr/>
         </p:nvSpPr>
         <p:spPr>
           <a:xfrm>
             <a:off x="457200" y="1645920"/>
-            <a:ext cx="8229240" cy="3008520"/>
+            <a:ext cx="8228880" cy="3008160"/>
           </a:xfrm>
           <a:prstGeom prst="rect">
             <a:avLst/>
@@ -6619,19 +6813,31 @@
           <a:p>
             <a:r>
               <a:rPr b="1" lang="en-US" strike="noStrike">
-                <a:latin typeface="DejaVu Sans"/>
+                <a:solidFill>
+                  <a:srgbClr val="000000"/>
+                </a:solidFill>
+                <a:latin typeface="DejaVu Sans"/>
+                <a:ea typeface="DejaVu Sans"/>
               </a:rPr>
               <a:t>Design choice: </a:t>
             </a:r>
             <a:r>
               <a:rPr lang="en-US" strike="noStrike">
-                <a:latin typeface="DejaVu Sans"/>
+                <a:solidFill>
+                  <a:srgbClr val="000000"/>
+                </a:solidFill>
+                <a:latin typeface="DejaVu Sans"/>
+                <a:ea typeface="DejaVu Sans"/>
               </a:rPr>
               <a:t>Stereo Pair</a:t>
             </a:r>
             <a:r>
               <a:rPr b="1" lang="en-US" strike="noStrike">
-                <a:latin typeface="DejaVu Sans"/>
+                <a:solidFill>
+                  <a:srgbClr val="000000"/>
+                </a:solidFill>
+                <a:latin typeface="DejaVu Sans"/>
+                <a:ea typeface="DejaVu Sans"/>
               </a:rPr>
               <a:t> </a:t>
             </a:r>
@@ -6640,7 +6846,11 @@
           <a:p>
             <a:r>
               <a:rPr lang="en-US" strike="noStrike">
-                <a:latin typeface="DejaVu Sans"/>
+                <a:solidFill>
+                  <a:srgbClr val="000000"/>
+                </a:solidFill>
+                <a:latin typeface="DejaVu Sans"/>
+                <a:ea typeface="DejaVu Sans"/>
               </a:rPr>
               <a:t>	</a:t>
             </a:r>
@@ -6649,25 +6859,41 @@
           <a:p>
             <a:r>
               <a:rPr lang="en-US" strike="noStrike">
-                <a:latin typeface="DejaVu Sans"/>
+                <a:solidFill>
+                  <a:srgbClr val="000000"/>
+                </a:solidFill>
+                <a:latin typeface="DejaVu Sans"/>
+                <a:ea typeface="DejaVu Sans"/>
               </a:rPr>
               <a:t>	</a:t>
             </a:r>
             <a:r>
               <a:rPr lang="en-US" strike="noStrike">
-                <a:latin typeface="DejaVu Sans"/>
+                <a:solidFill>
+                  <a:srgbClr val="000000"/>
+                </a:solidFill>
+                <a:latin typeface="DejaVu Sans"/>
+                <a:ea typeface="DejaVu Sans"/>
               </a:rPr>
               <a:t>Depth maps produced by </a:t>
             </a:r>
             <a:r>
               <a:rPr i="1" lang="en-US" strike="noStrike">
-                <a:latin typeface="DejaVu Sans"/>
+                <a:solidFill>
+                  <a:srgbClr val="000000"/>
+                </a:solidFill>
+                <a:latin typeface="DejaVu Sans"/>
+                <a:ea typeface="DejaVu Sans"/>
               </a:rPr>
               <a:t>Guidance</a:t>
             </a:r>
             <a:r>
               <a:rPr lang="en-US" strike="noStrike">
-                <a:latin typeface="DejaVu Sans"/>
+                <a:solidFill>
+                  <a:srgbClr val="000000"/>
+                </a:solidFill>
+                <a:latin typeface="DejaVu Sans"/>
+                <a:ea typeface="DejaVu Sans"/>
               </a:rPr>
               <a:t> show poor performance, related to stereo pipeline algorithm parameters that can't be changed</a:t>
             </a:r>
@@ -6679,13 +6905,21 @@
           <a:p>
             <a:r>
               <a:rPr lang="en-US" strike="noStrike">
-                <a:latin typeface="DejaVu Sans"/>
+                <a:solidFill>
+                  <a:srgbClr val="000000"/>
+                </a:solidFill>
+                <a:latin typeface="DejaVu Sans"/>
+                <a:ea typeface="DejaVu Sans"/>
               </a:rPr>
               <a:t>	</a:t>
             </a:r>
             <a:r>
               <a:rPr lang="en-US" strike="noStrike">
-                <a:latin typeface="DejaVu Sans"/>
+                <a:solidFill>
+                  <a:srgbClr val="000000"/>
+                </a:solidFill>
+                <a:latin typeface="DejaVu Sans"/>
+                <a:ea typeface="DejaVu Sans"/>
               </a:rPr>
               <a:t>Software stereo pipeline available to produce depth maps for use in target registration to 3D coordinates</a:t>
             </a:r>
@@ -6694,7 +6928,11 @@
           <a:p>
             <a:r>
               <a:rPr lang="en-US" strike="noStrike">
-                <a:latin typeface="DejaVu Sans"/>
+                <a:solidFill>
+                  <a:srgbClr val="000000"/>
+                </a:solidFill>
+                <a:latin typeface="DejaVu Sans"/>
+                <a:ea typeface="DejaVu Sans"/>
               </a:rPr>
               <a:t>	</a:t>
             </a:r>
@@ -6706,7 +6944,11 @@
           <a:p>
             <a:r>
               <a:rPr lang="en-US" strike="noStrike">
-                <a:latin typeface="DejaVu Sans"/>
+                <a:solidFill>
+                  <a:srgbClr val="000000"/>
+                </a:solidFill>
+                <a:latin typeface="DejaVu Sans"/>
+                <a:ea typeface="DejaVu Sans"/>
               </a:rPr>
               <a:t>	</a:t>
             </a:r>
@@ -6715,7 +6957,11 @@
           <a:p>
             <a:r>
               <a:rPr lang="en-US" strike="noStrike">
-                <a:latin typeface="DejaVu Sans"/>
+                <a:solidFill>
+                  <a:srgbClr val="000000"/>
+                </a:solidFill>
+                <a:latin typeface="DejaVu Sans"/>
+                <a:ea typeface="DejaVu Sans"/>
               </a:rPr>
               <a:t>	</a:t>
             </a:r>
@@ -6725,14 +6971,14 @@
       </p:sp>
       <p:sp>
         <p:nvSpPr>
-          <p:cNvPr id="114" name="CustomShape 5"/>
+          <p:cNvPr id="112" name="CustomShape 5"/>
           <p:cNvSpPr/>
           <p:nvPr/>
         </p:nvSpPr>
         <p:spPr>
           <a:xfrm>
             <a:off x="365760" y="1005480"/>
-            <a:ext cx="8229240" cy="1151280"/>
+            <a:ext cx="8228880" cy="1150920"/>
           </a:xfrm>
           <a:prstGeom prst="rect">
             <a:avLst/>
@@ -6753,13 +6999,21 @@
           <a:p>
             <a:r>
               <a:rPr i="1" lang="en-US" strike="noStrike">
-                <a:latin typeface="DejaVu Sans"/>
+                <a:solidFill>
+                  <a:srgbClr val="000000"/>
+                </a:solidFill>
+                <a:latin typeface="DejaVu Sans"/>
+                <a:ea typeface="DejaVu Sans"/>
               </a:rPr>
               <a:t>RTABMap</a:t>
             </a:r>
             <a:r>
               <a:rPr lang="en-US" strike="noStrike">
-                <a:latin typeface="DejaVu Sans"/>
+                <a:solidFill>
+                  <a:srgbClr val="000000"/>
+                </a:solidFill>
+                <a:latin typeface="DejaVu Sans"/>
+                <a:ea typeface="DejaVu Sans"/>
               </a:rPr>
               <a:t> requires imagery input, either as a RGB-D or a stereo pair</a:t>
             </a:r>
@@ -6771,7 +7025,11 @@
           <a:p>
             <a:r>
               <a:rPr lang="en-US" strike="noStrike">
-                <a:latin typeface="DejaVu Sans"/>
+                <a:solidFill>
+                  <a:srgbClr val="000000"/>
+                </a:solidFill>
+                <a:latin typeface="DejaVu Sans"/>
+                <a:ea typeface="DejaVu Sans"/>
               </a:rPr>
               <a:t>	</a:t>
             </a:r>
@@ -6780,7 +7038,11 @@
           <a:p>
             <a:r>
               <a:rPr lang="en-US" strike="noStrike">
-                <a:latin typeface="DejaVu Sans"/>
+                <a:solidFill>
+                  <a:srgbClr val="000000"/>
+                </a:solidFill>
+                <a:latin typeface="DejaVu Sans"/>
+                <a:ea typeface="DejaVu Sans"/>
               </a:rPr>
               <a:t>	</a:t>
             </a:r>
@@ -6790,19 +7052,19 @@
       </p:sp>
       <p:pic>
         <p:nvPicPr>
-          <p:cNvPr id="115" name="" descr=""/>
+          <p:cNvPr id="113" name="" descr=""/>
           <p:cNvPicPr/>
           <p:nvPr/>
         </p:nvPicPr>
         <p:blipFill>
           <a:blip r:embed="rId3"/>
-          <a:srcRect l="34978" t="26553" r="35866" b="24077"/>
+          <a:srcRect l="34975" t="26546" r="35863" b="24071"/>
           <a:stretch/>
         </p:blipFill>
         <p:spPr>
           <a:xfrm>
             <a:off x="4881600" y="3566160"/>
-            <a:ext cx="3896280" cy="2979360"/>
+            <a:ext cx="3895920" cy="2979000"/>
           </a:xfrm>
           <a:prstGeom prst="rect">
             <a:avLst/>
@@ -6814,7 +7076,7 @@
       </p:pic>
       <p:pic>
         <p:nvPicPr>
-          <p:cNvPr id="116" name="" descr=""/>
+          <p:cNvPr id="114" name="" descr=""/>
           <p:cNvPicPr/>
           <p:nvPr/>
         </p:nvPicPr>
@@ -6825,7 +7087,7 @@
         <p:spPr>
           <a:xfrm>
             <a:off x="640080" y="3827520"/>
-            <a:ext cx="3672720" cy="1658520"/>
+            <a:ext cx="3672360" cy="1658160"/>
           </a:xfrm>
           <a:prstGeom prst="rect">
             <a:avLst/>
@@ -6837,14 +7099,14 @@
       </p:pic>
       <p:sp>
         <p:nvSpPr>
-          <p:cNvPr id="117" name="CustomShape 6"/>
+          <p:cNvPr id="115" name="CustomShape 6"/>
           <p:cNvSpPr/>
           <p:nvPr/>
         </p:nvSpPr>
         <p:spPr>
           <a:xfrm>
             <a:off x="640080" y="5760720"/>
-            <a:ext cx="3840120" cy="355320"/>
+            <a:ext cx="3839760" cy="354960"/>
           </a:xfrm>
           <a:prstGeom prst="rect">
             <a:avLst/>
@@ -6865,7 +7127,11 @@
           <a:p>
             <a:r>
               <a:rPr i="1" lang="en-US" strike="noStrike">
-                <a:latin typeface="DejaVu Sans"/>
+                <a:solidFill>
+                  <a:srgbClr val="000000"/>
+                </a:solidFill>
+                <a:latin typeface="DejaVu Sans"/>
+                <a:ea typeface="DejaVu Sans"/>
               </a:rPr>
               <a:t>Map produced by RGB+Depth</a:t>
             </a:r>
@@ -6875,14 +7141,14 @@
       </p:sp>
       <p:sp>
         <p:nvSpPr>
-          <p:cNvPr id="118" name="CustomShape 7"/>
+          <p:cNvPr id="116" name="CustomShape 7"/>
           <p:cNvSpPr/>
           <p:nvPr/>
         </p:nvSpPr>
         <p:spPr>
           <a:xfrm>
             <a:off x="4937760" y="6217920"/>
-            <a:ext cx="3840120" cy="355320"/>
+            <a:ext cx="3839760" cy="354960"/>
           </a:xfrm>
           <a:prstGeom prst="rect">
             <a:avLst/>
@@ -6903,7 +7169,11 @@
           <a:p>
             <a:r>
               <a:rPr i="1" lang="en-US" strike="noStrike">
-                <a:latin typeface="DejaVu Sans"/>
+                <a:solidFill>
+                  <a:srgbClr val="000000"/>
+                </a:solidFill>
+                <a:latin typeface="DejaVu Sans"/>
+                <a:ea typeface="DejaVu Sans"/>
               </a:rPr>
               <a:t>Map produced by stereo pair</a:t>
             </a:r>
@@ -6962,7 +7232,7 @@
       </p:grpSpPr>
       <p:sp>
         <p:nvSpPr>
-          <p:cNvPr id="119" name="Line 1"/>
+          <p:cNvPr id="117" name="Line 1"/>
           <p:cNvSpPr/>
           <p:nvPr/>
         </p:nvSpPr>
@@ -6983,7 +7253,7 @@
       </p:sp>
       <p:pic>
         <p:nvPicPr>
-          <p:cNvPr id="120" name="Picture 5" descr=""/>
+          <p:cNvPr id="118" name="Picture 5" descr=""/>
           <p:cNvPicPr/>
           <p:nvPr/>
         </p:nvPicPr>
@@ -6994,7 +7264,7 @@
         <p:spPr>
           <a:xfrm>
             <a:off x="0" y="0"/>
-            <a:ext cx="1150920" cy="843120"/>
+            <a:ext cx="1150560" cy="842760"/>
           </a:xfrm>
           <a:prstGeom prst="rect">
             <a:avLst/>
@@ -7006,14 +7276,14 @@
       </p:pic>
       <p:sp>
         <p:nvSpPr>
-          <p:cNvPr id="121" name="CustomShape 2"/>
+          <p:cNvPr id="119" name="CustomShape 2"/>
           <p:cNvSpPr/>
           <p:nvPr/>
         </p:nvSpPr>
         <p:spPr>
           <a:xfrm>
             <a:off x="1151640" y="2160"/>
-            <a:ext cx="7991640" cy="831240"/>
+            <a:ext cx="7991280" cy="830880"/>
           </a:xfrm>
           <a:prstGeom prst="rect">
             <a:avLst/>
@@ -7050,7 +7320,7 @@
       </p:sp>
       <p:pic>
         <p:nvPicPr>
-          <p:cNvPr id="122" name="Picture 7" descr=""/>
+          <p:cNvPr id="120" name="Picture 7" descr=""/>
           <p:cNvPicPr/>
           <p:nvPr/>
         </p:nvPicPr>
@@ -7061,7 +7331,7 @@
         <p:spPr>
           <a:xfrm>
             <a:off x="8310960" y="2160"/>
-            <a:ext cx="832320" cy="832320"/>
+            <a:ext cx="831960" cy="831960"/>
           </a:xfrm>
           <a:prstGeom prst="rect">
             <a:avLst/>
@@ -7073,14 +7343,14 @@
       </p:pic>
       <p:sp>
         <p:nvSpPr>
-          <p:cNvPr id="123" name="CustomShape 3"/>
+          <p:cNvPr id="121" name="CustomShape 3"/>
           <p:cNvSpPr/>
           <p:nvPr/>
         </p:nvSpPr>
         <p:spPr>
           <a:xfrm>
             <a:off x="1202040" y="188640"/>
-            <a:ext cx="6982560" cy="455760"/>
+            <a:ext cx="6982200" cy="455400"/>
           </a:xfrm>
           <a:prstGeom prst="rect">
             <a:avLst/>
@@ -7120,14 +7390,14 @@
       </p:sp>
       <p:sp>
         <p:nvSpPr>
-          <p:cNvPr id="124" name="CustomShape 4"/>
+          <p:cNvPr id="122" name="CustomShape 4"/>
           <p:cNvSpPr/>
           <p:nvPr/>
         </p:nvSpPr>
         <p:spPr>
           <a:xfrm>
             <a:off x="548640" y="1188720"/>
-            <a:ext cx="8229240" cy="2743200"/>
+            <a:ext cx="8228880" cy="2742840"/>
           </a:xfrm>
           <a:prstGeom prst="rect">
             <a:avLst/>
@@ -7148,7 +7418,11 @@
           <a:p>
             <a:r>
               <a:rPr b="1" lang="en-US" strike="noStrike">
-                <a:latin typeface="DejaVu Sans"/>
+                <a:solidFill>
+                  <a:srgbClr val="000000"/>
+                </a:solidFill>
+                <a:latin typeface="DejaVu Sans"/>
+                <a:ea typeface="DejaVu Sans"/>
               </a:rPr>
               <a:t>Design choice: Potentially laser altimeter</a:t>
             </a:r>
@@ -7157,7 +7431,11 @@
           <a:p>
             <a:r>
               <a:rPr lang="en-US" strike="noStrike">
-                <a:latin typeface="DejaVu Sans"/>
+                <a:solidFill>
+                  <a:srgbClr val="000000"/>
+                </a:solidFill>
+                <a:latin typeface="DejaVu Sans"/>
+                <a:ea typeface="DejaVu Sans"/>
               </a:rPr>
               <a:t>	</a:t>
             </a:r>
@@ -7166,19 +7444,31 @@
           <a:p>
             <a:r>
               <a:rPr lang="en-US" strike="noStrike">
-                <a:latin typeface="DejaVu Sans"/>
+                <a:solidFill>
+                  <a:srgbClr val="000000"/>
+                </a:solidFill>
+                <a:latin typeface="DejaVu Sans"/>
+                <a:ea typeface="DejaVu Sans"/>
               </a:rPr>
               <a:t>	</a:t>
             </a:r>
             <a:r>
               <a:rPr i="1" lang="en-US" strike="noStrike">
-                <a:latin typeface="DejaVu Sans"/>
+                <a:solidFill>
+                  <a:srgbClr val="000000"/>
+                </a:solidFill>
+                <a:latin typeface="DejaVu Sans"/>
+                <a:ea typeface="DejaVu Sans"/>
               </a:rPr>
               <a:t>Guidance</a:t>
             </a:r>
             <a:r>
               <a:rPr lang="en-US" strike="noStrike">
-                <a:latin typeface="DejaVu Sans"/>
+                <a:solidFill>
+                  <a:srgbClr val="000000"/>
+                </a:solidFill>
+                <a:latin typeface="DejaVu Sans"/>
+                <a:ea typeface="DejaVu Sans"/>
               </a:rPr>
               <a:t> provides ultrasounds for coarse object detection and coarse altitude estimation</a:t>
             </a:r>
@@ -7187,7 +7477,11 @@
           <a:p>
             <a:r>
               <a:rPr lang="en-US" strike="noStrike">
-                <a:latin typeface="DejaVu Sans"/>
+                <a:solidFill>
+                  <a:srgbClr val="000000"/>
+                </a:solidFill>
+                <a:latin typeface="DejaVu Sans"/>
+                <a:ea typeface="DejaVu Sans"/>
               </a:rPr>
               <a:t>	</a:t>
             </a:r>
@@ -7196,13 +7490,21 @@
           <a:p>
             <a:r>
               <a:rPr lang="en-US" strike="noStrike">
-                <a:latin typeface="DejaVu Sans"/>
+                <a:solidFill>
+                  <a:srgbClr val="000000"/>
+                </a:solidFill>
+                <a:latin typeface="DejaVu Sans"/>
+                <a:ea typeface="DejaVu Sans"/>
               </a:rPr>
               <a:t>	</a:t>
             </a:r>
             <a:r>
               <a:rPr lang="en-US" strike="noStrike">
-                <a:latin typeface="DejaVu Sans"/>
+                <a:solidFill>
+                  <a:srgbClr val="000000"/>
+                </a:solidFill>
+                <a:latin typeface="DejaVu Sans"/>
+                <a:ea typeface="DejaVu Sans"/>
               </a:rPr>
               <a:t>As testing proceeds, the laser altimeter may become necessary to ensure safe autonomous takeoffs and landings </a:t>
             </a:r>
@@ -7214,7 +7516,11 @@
           <a:p>
             <a:r>
               <a:rPr lang="en-US" strike="noStrike">
-                <a:latin typeface="DejaVu Sans"/>
+                <a:solidFill>
+                  <a:srgbClr val="000000"/>
+                </a:solidFill>
+                <a:latin typeface="DejaVu Sans"/>
+                <a:ea typeface="DejaVu Sans"/>
               </a:rPr>
               <a:t>	</a:t>
             </a:r>
@@ -7223,7 +7529,11 @@
           <a:p>
             <a:r>
               <a:rPr lang="en-US" strike="noStrike">
-                <a:latin typeface="DejaVu Sans"/>
+                <a:solidFill>
+                  <a:srgbClr val="000000"/>
+                </a:solidFill>
+                <a:latin typeface="DejaVu Sans"/>
+                <a:ea typeface="DejaVu Sans"/>
               </a:rPr>
               <a:t>	</a:t>
             </a:r>
@@ -7282,7 +7592,7 @@
       </p:grpSpPr>
       <p:sp>
         <p:nvSpPr>
-          <p:cNvPr id="125" name="Line 1"/>
+          <p:cNvPr id="123" name="Line 1"/>
           <p:cNvSpPr/>
           <p:nvPr/>
         </p:nvSpPr>
@@ -7303,7 +7613,7 @@
       </p:sp>
       <p:pic>
         <p:nvPicPr>
-          <p:cNvPr id="126" name="Picture 5" descr=""/>
+          <p:cNvPr id="124" name="Picture 5" descr=""/>
           <p:cNvPicPr/>
           <p:nvPr/>
         </p:nvPicPr>
@@ -7314,7 +7624,7 @@
         <p:spPr>
           <a:xfrm>
             <a:off x="0" y="0"/>
-            <a:ext cx="1150920" cy="843120"/>
+            <a:ext cx="1150560" cy="842760"/>
           </a:xfrm>
           <a:prstGeom prst="rect">
             <a:avLst/>
@@ -7326,14 +7636,14 @@
       </p:pic>
       <p:sp>
         <p:nvSpPr>
-          <p:cNvPr id="127" name="CustomShape 2"/>
+          <p:cNvPr id="125" name="CustomShape 2"/>
           <p:cNvSpPr/>
           <p:nvPr/>
         </p:nvSpPr>
         <p:spPr>
           <a:xfrm>
             <a:off x="1151640" y="2160"/>
-            <a:ext cx="7991640" cy="831240"/>
+            <a:ext cx="7991280" cy="830880"/>
           </a:xfrm>
           <a:prstGeom prst="rect">
             <a:avLst/>
@@ -7370,7 +7680,7 @@
       </p:sp>
       <p:pic>
         <p:nvPicPr>
-          <p:cNvPr id="128" name="Picture 7" descr=""/>
+          <p:cNvPr id="126" name="Picture 7" descr=""/>
           <p:cNvPicPr/>
           <p:nvPr/>
         </p:nvPicPr>
@@ -7381,7 +7691,7 @@
         <p:spPr>
           <a:xfrm>
             <a:off x="8310960" y="2160"/>
-            <a:ext cx="832320" cy="832320"/>
+            <a:ext cx="831960" cy="831960"/>
           </a:xfrm>
           <a:prstGeom prst="rect">
             <a:avLst/>
@@ -7393,14 +7703,14 @@
       </p:pic>
       <p:sp>
         <p:nvSpPr>
-          <p:cNvPr id="129" name="CustomShape 3"/>
+          <p:cNvPr id="127" name="CustomShape 3"/>
           <p:cNvSpPr/>
           <p:nvPr/>
         </p:nvSpPr>
         <p:spPr>
           <a:xfrm>
             <a:off x="1202040" y="188640"/>
-            <a:ext cx="6982560" cy="455760"/>
+            <a:ext cx="6982200" cy="455400"/>
           </a:xfrm>
           <a:prstGeom prst="rect">
             <a:avLst/>
@@ -7450,7 +7760,7 @@
       </p:sp>
       <p:pic>
         <p:nvPicPr>
-          <p:cNvPr id="130" name="" descr=""/>
+          <p:cNvPr id="128" name="" descr=""/>
           <p:cNvPicPr/>
           <p:nvPr/>
         </p:nvPicPr>
@@ -7461,7 +7771,7 @@
         <p:spPr>
           <a:xfrm>
             <a:off x="203040" y="561960"/>
-            <a:ext cx="8846280" cy="5781600"/>
+            <a:ext cx="8845920" cy="5781240"/>
           </a:xfrm>
           <a:prstGeom prst="rect">
             <a:avLst/>
@@ -7522,7 +7832,7 @@
       </p:grpSpPr>
       <p:sp>
         <p:nvSpPr>
-          <p:cNvPr id="131" name="Line 1"/>
+          <p:cNvPr id="129" name="Line 1"/>
           <p:cNvSpPr/>
           <p:nvPr/>
         </p:nvSpPr>
@@ -7543,7 +7853,7 @@
       </p:sp>
       <p:pic>
         <p:nvPicPr>
-          <p:cNvPr id="132" name="Picture 5" descr=""/>
+          <p:cNvPr id="130" name="Picture 5" descr=""/>
           <p:cNvPicPr/>
           <p:nvPr/>
         </p:nvPicPr>
@@ -7554,7 +7864,7 @@
         <p:spPr>
           <a:xfrm>
             <a:off x="0" y="0"/>
-            <a:ext cx="1150920" cy="843120"/>
+            <a:ext cx="1150560" cy="842760"/>
           </a:xfrm>
           <a:prstGeom prst="rect">
             <a:avLst/>
@@ -7566,14 +7876,14 @@
       </p:pic>
       <p:sp>
         <p:nvSpPr>
-          <p:cNvPr id="133" name="CustomShape 2"/>
+          <p:cNvPr id="131" name="CustomShape 2"/>
           <p:cNvSpPr/>
           <p:nvPr/>
         </p:nvSpPr>
         <p:spPr>
           <a:xfrm>
             <a:off x="1151640" y="2160"/>
-            <a:ext cx="7991640" cy="831240"/>
+            <a:ext cx="7991280" cy="830880"/>
           </a:xfrm>
           <a:prstGeom prst="rect">
             <a:avLst/>
@@ -7610,7 +7920,7 @@
       </p:sp>
       <p:pic>
         <p:nvPicPr>
-          <p:cNvPr id="134" name="Picture 7" descr=""/>
+          <p:cNvPr id="132" name="Picture 7" descr=""/>
           <p:cNvPicPr/>
           <p:nvPr/>
         </p:nvPicPr>
@@ -7621,7 +7931,7 @@
         <p:spPr>
           <a:xfrm>
             <a:off x="8310960" y="2160"/>
-            <a:ext cx="832320" cy="832320"/>
+            <a:ext cx="831960" cy="831960"/>
           </a:xfrm>
           <a:prstGeom prst="rect">
             <a:avLst/>
@@ -7633,14 +7943,14 @@
       </p:pic>
       <p:sp>
         <p:nvSpPr>
-          <p:cNvPr id="135" name="CustomShape 3"/>
+          <p:cNvPr id="133" name="CustomShape 3"/>
           <p:cNvSpPr/>
           <p:nvPr/>
         </p:nvSpPr>
         <p:spPr>
           <a:xfrm>
             <a:off x="1202040" y="188640"/>
-            <a:ext cx="6982560" cy="455760"/>
+            <a:ext cx="6982200" cy="455400"/>
           </a:xfrm>
           <a:prstGeom prst="rect">
             <a:avLst/>
@@ -7690,7 +8000,7 @@
       </p:sp>
       <p:pic>
         <p:nvPicPr>
-          <p:cNvPr id="136" name="" descr=""/>
+          <p:cNvPr id="134" name="" descr=""/>
           <p:cNvPicPr/>
           <p:nvPr/>
         </p:nvPicPr>
@@ -7700,8 +8010,8 @@
         </p:blipFill>
         <p:spPr>
           <a:xfrm>
-            <a:off x="1269360" y="1310400"/>
-            <a:ext cx="6713280" cy="4285080"/>
+            <a:off x="1188720" y="1320840"/>
+            <a:ext cx="6713640" cy="4285440"/>
           </a:xfrm>
           <a:prstGeom prst="rect">
             <a:avLst/>

</xml_diff>